<commit_message>
Finished off BLP stuff and carried on with introduction.
</commit_message>
<xml_diff>
--- a/Figures/Powerpoints/5 plots.pptx
+++ b/Figures/Powerpoints/5 plots.pptx
@@ -2,17 +2,15 @@
 <file path=ppt/presentation.xml><?xml version="1.0" encoding="utf-8"?>
 <p:presentation xmlns:a="http://schemas.openxmlformats.org/drawingml/2006/main" xmlns:r="http://schemas.openxmlformats.org/officeDocument/2006/relationships" xmlns:p="http://schemas.openxmlformats.org/presentationml/2006/main" saveSubsetFonts="1">
   <p:sldMasterIdLst>
-    <p:sldMasterId id="2147483696" r:id="rId1"/>
+    <p:sldMasterId id="2147483720" r:id="rId1"/>
   </p:sldMasterIdLst>
   <p:notesMasterIdLst>
-    <p:notesMasterId r:id="rId5"/>
+    <p:notesMasterId r:id="rId3"/>
   </p:notesMasterIdLst>
   <p:sldIdLst>
     <p:sldId id="256" r:id="rId2"/>
-    <p:sldId id="257" r:id="rId3"/>
-    <p:sldId id="258" r:id="rId4"/>
   </p:sldIdLst>
-  <p:sldSz cx="14400213" cy="7199313"/>
+  <p:sldSz cx="18000663" cy="4319588"/>
   <p:notesSz cx="6858000" cy="9144000"/>
   <p:defaultTextStyle>
     <a:defPPr>
@@ -112,12 +110,12 @@
   <p:extLst>
     <p:ext uri="{EFAFB233-063F-42B5-8137-9DF3F51BA10A}">
       <p15:sldGuideLst xmlns:p15="http://schemas.microsoft.com/office/powerpoint/2012/main">
-        <p15:guide id="1" orient="horz" pos="2268" userDrawn="1">
+        <p15:guide id="1" orient="horz" pos="1361" userDrawn="1">
           <p15:clr>
             <a:srgbClr val="A4A3A4"/>
           </p15:clr>
         </p15:guide>
-        <p15:guide id="2" pos="4536" userDrawn="1">
+        <p15:guide id="2" pos="5670" userDrawn="1">
           <p15:clr>
             <a:srgbClr val="A4A3A4"/>
           </p15:clr>
@@ -210,7 +208,7 @@
           <a:p>
             <a:fld id="{A1170C28-2994-474D-8BBF-3B11C9FA2A9F}" type="datetimeFigureOut">
               <a:rPr lang="en-GB" smtClean="0"/>
-              <a:t>08/08/2015</a:t>
+              <a:t>11/08/2015</a:t>
             </a:fld>
             <a:endParaRPr lang="en-GB"/>
           </a:p>
@@ -228,8 +226,8 @@
         </p:nvSpPr>
         <p:spPr>
           <a:xfrm>
-            <a:off x="342900" y="1143000"/>
-            <a:ext cx="6172200" cy="3086100"/>
+            <a:off x="-3000375" y="1143000"/>
+            <a:ext cx="12858750" cy="3086100"/>
           </a:xfrm>
           <a:prstGeom prst="rect">
             <a:avLst/>
@@ -478,270 +476,6 @@
 </p:notesMaster>
 </file>
 
-<file path=ppt/notesSlides/notesSlide1.xml><?xml version="1.0" encoding="utf-8"?>
-<p:notes xmlns:a="http://schemas.openxmlformats.org/drawingml/2006/main" xmlns:r="http://schemas.openxmlformats.org/officeDocument/2006/relationships" xmlns:p="http://schemas.openxmlformats.org/presentationml/2006/main">
-  <p:cSld>
-    <p:spTree>
-      <p:nvGrpSpPr>
-        <p:cNvPr id="1" name=""/>
-        <p:cNvGrpSpPr/>
-        <p:nvPr/>
-      </p:nvGrpSpPr>
-      <p:grpSpPr>
-        <a:xfrm>
-          <a:off x="0" y="0"/>
-          <a:ext cx="0" cy="0"/>
-          <a:chOff x="0" y="0"/>
-          <a:chExt cx="0" cy="0"/>
-        </a:xfrm>
-      </p:grpSpPr>
-      <p:sp>
-        <p:nvSpPr>
-          <p:cNvPr id="2" name="Slide Image Placeholder 1"/>
-          <p:cNvSpPr>
-            <a:spLocks noGrp="1" noRot="1" noChangeAspect="1"/>
-          </p:cNvSpPr>
-          <p:nvPr>
-            <p:ph type="sldImg"/>
-          </p:nvPr>
-        </p:nvSpPr>
-        <p:spPr/>
-      </p:sp>
-      <p:sp>
-        <p:nvSpPr>
-          <p:cNvPr id="3" name="Notes Placeholder 2"/>
-          <p:cNvSpPr>
-            <a:spLocks noGrp="1"/>
-          </p:cNvSpPr>
-          <p:nvPr>
-            <p:ph type="body" idx="1"/>
-          </p:nvPr>
-        </p:nvSpPr>
-        <p:spPr/>
-        <p:txBody>
-          <a:bodyPr/>
-          <a:lstStyle/>
-          <a:p>
-            <a:r>
-              <a:rPr lang="en-GB" dirty="0" smtClean="0"/>
-              <a:t>Bone marrow</a:t>
-            </a:r>
-            <a:endParaRPr lang="en-GB" dirty="0"/>
-          </a:p>
-        </p:txBody>
-      </p:sp>
-      <p:sp>
-        <p:nvSpPr>
-          <p:cNvPr id="4" name="Slide Number Placeholder 3"/>
-          <p:cNvSpPr>
-            <a:spLocks noGrp="1"/>
-          </p:cNvSpPr>
-          <p:nvPr>
-            <p:ph type="sldNum" sz="quarter" idx="10"/>
-          </p:nvPr>
-        </p:nvSpPr>
-        <p:spPr/>
-        <p:txBody>
-          <a:bodyPr/>
-          <a:lstStyle/>
-          <a:p>
-            <a:fld id="{5958A415-9BB4-4D1A-8B09-202B4B84EAF9}" type="slidenum">
-              <a:rPr lang="en-GB" smtClean="0"/>
-              <a:t>1</a:t>
-            </a:fld>
-            <a:endParaRPr lang="en-GB"/>
-          </a:p>
-        </p:txBody>
-      </p:sp>
-    </p:spTree>
-    <p:extLst>
-      <p:ext uri="{BB962C8B-B14F-4D97-AF65-F5344CB8AC3E}">
-        <p14:creationId xmlns:p14="http://schemas.microsoft.com/office/powerpoint/2010/main" val="649913984"/>
-      </p:ext>
-    </p:extLst>
-  </p:cSld>
-  <p:clrMapOvr>
-    <a:masterClrMapping/>
-  </p:clrMapOvr>
-</p:notes>
-</file>
-
-<file path=ppt/notesSlides/notesSlide2.xml><?xml version="1.0" encoding="utf-8"?>
-<p:notes xmlns:a="http://schemas.openxmlformats.org/drawingml/2006/main" xmlns:r="http://schemas.openxmlformats.org/officeDocument/2006/relationships" xmlns:p="http://schemas.openxmlformats.org/presentationml/2006/main">
-  <p:cSld>
-    <p:spTree>
-      <p:nvGrpSpPr>
-        <p:cNvPr id="1" name=""/>
-        <p:cNvGrpSpPr/>
-        <p:nvPr/>
-      </p:nvGrpSpPr>
-      <p:grpSpPr>
-        <a:xfrm>
-          <a:off x="0" y="0"/>
-          <a:ext cx="0" cy="0"/>
-          <a:chOff x="0" y="0"/>
-          <a:chExt cx="0" cy="0"/>
-        </a:xfrm>
-      </p:grpSpPr>
-      <p:sp>
-        <p:nvSpPr>
-          <p:cNvPr id="2" name="Slide Image Placeholder 1"/>
-          <p:cNvSpPr>
-            <a:spLocks noGrp="1" noRot="1" noChangeAspect="1"/>
-          </p:cNvSpPr>
-          <p:nvPr>
-            <p:ph type="sldImg"/>
-          </p:nvPr>
-        </p:nvSpPr>
-        <p:spPr/>
-      </p:sp>
-      <p:sp>
-        <p:nvSpPr>
-          <p:cNvPr id="3" name="Notes Placeholder 2"/>
-          <p:cNvSpPr>
-            <a:spLocks noGrp="1"/>
-          </p:cNvSpPr>
-          <p:nvPr>
-            <p:ph type="body" idx="1"/>
-          </p:nvPr>
-        </p:nvSpPr>
-        <p:spPr/>
-        <p:txBody>
-          <a:bodyPr/>
-          <a:lstStyle/>
-          <a:p>
-            <a:r>
-              <a:rPr lang="en-GB" dirty="0" smtClean="0"/>
-              <a:t>Spleen</a:t>
-            </a:r>
-            <a:endParaRPr lang="en-GB" dirty="0"/>
-          </a:p>
-        </p:txBody>
-      </p:sp>
-      <p:sp>
-        <p:nvSpPr>
-          <p:cNvPr id="4" name="Slide Number Placeholder 3"/>
-          <p:cNvSpPr>
-            <a:spLocks noGrp="1"/>
-          </p:cNvSpPr>
-          <p:nvPr>
-            <p:ph type="sldNum" sz="quarter" idx="10"/>
-          </p:nvPr>
-        </p:nvSpPr>
-        <p:spPr/>
-        <p:txBody>
-          <a:bodyPr/>
-          <a:lstStyle/>
-          <a:p>
-            <a:fld id="{5958A415-9BB4-4D1A-8B09-202B4B84EAF9}" type="slidenum">
-              <a:rPr lang="en-GB" smtClean="0"/>
-              <a:t>2</a:t>
-            </a:fld>
-            <a:endParaRPr lang="en-GB"/>
-          </a:p>
-        </p:txBody>
-      </p:sp>
-    </p:spTree>
-    <p:extLst>
-      <p:ext uri="{BB962C8B-B14F-4D97-AF65-F5344CB8AC3E}">
-        <p14:creationId xmlns:p14="http://schemas.microsoft.com/office/powerpoint/2010/main" val="804160699"/>
-      </p:ext>
-    </p:extLst>
-  </p:cSld>
-  <p:clrMapOvr>
-    <a:masterClrMapping/>
-  </p:clrMapOvr>
-</p:notes>
-</file>
-
-<file path=ppt/notesSlides/notesSlide3.xml><?xml version="1.0" encoding="utf-8"?>
-<p:notes xmlns:a="http://schemas.openxmlformats.org/drawingml/2006/main" xmlns:r="http://schemas.openxmlformats.org/officeDocument/2006/relationships" xmlns:p="http://schemas.openxmlformats.org/presentationml/2006/main">
-  <p:cSld>
-    <p:spTree>
-      <p:nvGrpSpPr>
-        <p:cNvPr id="1" name=""/>
-        <p:cNvGrpSpPr/>
-        <p:nvPr/>
-      </p:nvGrpSpPr>
-      <p:grpSpPr>
-        <a:xfrm>
-          <a:off x="0" y="0"/>
-          <a:ext cx="0" cy="0"/>
-          <a:chOff x="0" y="0"/>
-          <a:chExt cx="0" cy="0"/>
-        </a:xfrm>
-      </p:grpSpPr>
-      <p:sp>
-        <p:nvSpPr>
-          <p:cNvPr id="2" name="Slide Image Placeholder 1"/>
-          <p:cNvSpPr>
-            <a:spLocks noGrp="1" noRot="1" noChangeAspect="1"/>
-          </p:cNvSpPr>
-          <p:nvPr>
-            <p:ph type="sldImg"/>
-          </p:nvPr>
-        </p:nvSpPr>
-        <p:spPr/>
-      </p:sp>
-      <p:sp>
-        <p:nvSpPr>
-          <p:cNvPr id="3" name="Notes Placeholder 2"/>
-          <p:cNvSpPr>
-            <a:spLocks noGrp="1"/>
-          </p:cNvSpPr>
-          <p:nvPr>
-            <p:ph type="body" idx="1"/>
-          </p:nvPr>
-        </p:nvSpPr>
-        <p:spPr/>
-        <p:txBody>
-          <a:bodyPr/>
-          <a:lstStyle/>
-          <a:p>
-            <a:r>
-              <a:rPr lang="en-GB" dirty="0" smtClean="0"/>
-              <a:t>Thymus (gated)</a:t>
-            </a:r>
-            <a:endParaRPr lang="en-GB" dirty="0"/>
-          </a:p>
-        </p:txBody>
-      </p:sp>
-      <p:sp>
-        <p:nvSpPr>
-          <p:cNvPr id="4" name="Slide Number Placeholder 3"/>
-          <p:cNvSpPr>
-            <a:spLocks noGrp="1"/>
-          </p:cNvSpPr>
-          <p:nvPr>
-            <p:ph type="sldNum" sz="quarter" idx="10"/>
-          </p:nvPr>
-        </p:nvSpPr>
-        <p:spPr/>
-        <p:txBody>
-          <a:bodyPr/>
-          <a:lstStyle/>
-          <a:p>
-            <a:fld id="{5958A415-9BB4-4D1A-8B09-202B4B84EAF9}" type="slidenum">
-              <a:rPr lang="en-GB" smtClean="0"/>
-              <a:t>3</a:t>
-            </a:fld>
-            <a:endParaRPr lang="en-GB"/>
-          </a:p>
-        </p:txBody>
-      </p:sp>
-    </p:spTree>
-    <p:extLst>
-      <p:ext uri="{BB962C8B-B14F-4D97-AF65-F5344CB8AC3E}">
-        <p14:creationId xmlns:p14="http://schemas.microsoft.com/office/powerpoint/2010/main" val="576324207"/>
-      </p:ext>
-    </p:extLst>
-  </p:cSld>
-  <p:clrMapOvr>
-    <a:masterClrMapping/>
-  </p:clrMapOvr>
-</p:notes>
-</file>
-
 <file path=ppt/slideLayouts/slideLayout1.xml><?xml version="1.0" encoding="utf-8"?>
 <p:sldLayout xmlns:a="http://schemas.openxmlformats.org/drawingml/2006/main" xmlns:r="http://schemas.openxmlformats.org/officeDocument/2006/relationships" xmlns:p="http://schemas.openxmlformats.org/presentationml/2006/main" type="title" preserve="1">
   <p:cSld name="Title Slide">
@@ -771,15 +505,15 @@
         </p:nvSpPr>
         <p:spPr>
           <a:xfrm>
-            <a:off x="1800027" y="1178222"/>
-            <a:ext cx="10800160" cy="2506427"/>
+            <a:off x="2250083" y="706933"/>
+            <a:ext cx="13500497" cy="1503857"/>
           </a:xfrm>
         </p:spPr>
         <p:txBody>
           <a:bodyPr anchor="b"/>
           <a:lstStyle>
             <a:lvl1pPr algn="ctr">
-              <a:defRPr sz="6299"/>
+              <a:defRPr sz="3779"/>
             </a:lvl1pPr>
           </a:lstStyle>
           <a:p>
@@ -803,8 +537,8 @@
         </p:nvSpPr>
         <p:spPr>
           <a:xfrm>
-            <a:off x="1800027" y="3781306"/>
-            <a:ext cx="10800160" cy="1738167"/>
+            <a:off x="2250083" y="2268784"/>
+            <a:ext cx="13500497" cy="1042900"/>
           </a:xfrm>
         </p:spPr>
         <p:txBody>
@@ -812,39 +546,39 @@
           <a:lstStyle>
             <a:lvl1pPr marL="0" indent="0" algn="ctr">
               <a:buNone/>
-              <a:defRPr sz="2520"/>
+              <a:defRPr sz="1512"/>
             </a:lvl1pPr>
-            <a:lvl2pPr marL="479969" indent="0" algn="ctr">
-              <a:buNone/>
-              <a:defRPr sz="2100"/>
+            <a:lvl2pPr marL="287990" indent="0" algn="ctr">
+              <a:buNone/>
+              <a:defRPr sz="1260"/>
             </a:lvl2pPr>
-            <a:lvl3pPr marL="959937" indent="0" algn="ctr">
-              <a:buNone/>
-              <a:defRPr sz="1890"/>
+            <a:lvl3pPr marL="575981" indent="0" algn="ctr">
+              <a:buNone/>
+              <a:defRPr sz="1134"/>
             </a:lvl3pPr>
-            <a:lvl4pPr marL="1439906" indent="0" algn="ctr">
-              <a:buNone/>
-              <a:defRPr sz="1680"/>
+            <a:lvl4pPr marL="863971" indent="0" algn="ctr">
+              <a:buNone/>
+              <a:defRPr sz="1008"/>
             </a:lvl4pPr>
-            <a:lvl5pPr marL="1919874" indent="0" algn="ctr">
-              <a:buNone/>
-              <a:defRPr sz="1680"/>
+            <a:lvl5pPr marL="1151961" indent="0" algn="ctr">
+              <a:buNone/>
+              <a:defRPr sz="1008"/>
             </a:lvl5pPr>
-            <a:lvl6pPr marL="2399843" indent="0" algn="ctr">
-              <a:buNone/>
-              <a:defRPr sz="1680"/>
+            <a:lvl6pPr marL="1439951" indent="0" algn="ctr">
+              <a:buNone/>
+              <a:defRPr sz="1008"/>
             </a:lvl6pPr>
-            <a:lvl7pPr marL="2879811" indent="0" algn="ctr">
-              <a:buNone/>
-              <a:defRPr sz="1680"/>
+            <a:lvl7pPr marL="1727942" indent="0" algn="ctr">
+              <a:buNone/>
+              <a:defRPr sz="1008"/>
             </a:lvl7pPr>
-            <a:lvl8pPr marL="3359780" indent="0" algn="ctr">
-              <a:buNone/>
-              <a:defRPr sz="1680"/>
+            <a:lvl8pPr marL="2015932" indent="0" algn="ctr">
+              <a:buNone/>
+              <a:defRPr sz="1008"/>
             </a:lvl8pPr>
-            <a:lvl9pPr marL="3839748" indent="0" algn="ctr">
-              <a:buNone/>
-              <a:defRPr sz="1680"/>
+            <a:lvl9pPr marL="2303922" indent="0" algn="ctr">
+              <a:buNone/>
+              <a:defRPr sz="1008"/>
             </a:lvl9pPr>
           </a:lstStyle>
           <a:p>
@@ -873,7 +607,7 @@
           <a:p>
             <a:fld id="{71B8501F-095D-4FB7-9E41-AD32C3E49B00}" type="datetimeFigureOut">
               <a:rPr lang="en-GB" smtClean="0"/>
-              <a:t>08/08/2015</a:t>
+              <a:t>11/08/2015</a:t>
             </a:fld>
             <a:endParaRPr lang="en-GB"/>
           </a:p>
@@ -924,7 +658,7 @@
     </p:spTree>
     <p:extLst>
       <p:ext uri="{BB962C8B-B14F-4D97-AF65-F5344CB8AC3E}">
-        <p14:creationId xmlns:p14="http://schemas.microsoft.com/office/powerpoint/2010/main" val="812801512"/>
+        <p14:creationId xmlns:p14="http://schemas.microsoft.com/office/powerpoint/2010/main" val="3436201414"/>
       </p:ext>
     </p:extLst>
   </p:cSld>
@@ -1043,7 +777,7 @@
           <a:p>
             <a:fld id="{71B8501F-095D-4FB7-9E41-AD32C3E49B00}" type="datetimeFigureOut">
               <a:rPr lang="en-GB" smtClean="0"/>
-              <a:t>08/08/2015</a:t>
+              <a:t>11/08/2015</a:t>
             </a:fld>
             <a:endParaRPr lang="en-GB"/>
           </a:p>
@@ -1094,7 +828,7 @@
     </p:spTree>
     <p:extLst>
       <p:ext uri="{BB962C8B-B14F-4D97-AF65-F5344CB8AC3E}">
-        <p14:creationId xmlns:p14="http://schemas.microsoft.com/office/powerpoint/2010/main" val="1305022899"/>
+        <p14:creationId xmlns:p14="http://schemas.microsoft.com/office/powerpoint/2010/main" val="125678532"/>
       </p:ext>
     </p:extLst>
   </p:cSld>
@@ -1133,8 +867,8 @@
         </p:nvSpPr>
         <p:spPr>
           <a:xfrm>
-            <a:off x="10305152" y="383297"/>
-            <a:ext cx="3105046" cy="6101085"/>
+            <a:off x="12881724" y="229978"/>
+            <a:ext cx="3881393" cy="3660651"/>
           </a:xfrm>
         </p:spPr>
         <p:txBody>
@@ -1161,8 +895,8 @@
         </p:nvSpPr>
         <p:spPr>
           <a:xfrm>
-            <a:off x="990015" y="383297"/>
-            <a:ext cx="9135135" cy="6101085"/>
+            <a:off x="1237545" y="229978"/>
+            <a:ext cx="11419171" cy="3660651"/>
           </a:xfrm>
         </p:spPr>
         <p:txBody>
@@ -1223,7 +957,7 @@
           <a:p>
             <a:fld id="{71B8501F-095D-4FB7-9E41-AD32C3E49B00}" type="datetimeFigureOut">
               <a:rPr lang="en-GB" smtClean="0"/>
-              <a:t>08/08/2015</a:t>
+              <a:t>11/08/2015</a:t>
             </a:fld>
             <a:endParaRPr lang="en-GB"/>
           </a:p>
@@ -1274,7 +1008,7 @@
     </p:spTree>
     <p:extLst>
       <p:ext uri="{BB962C8B-B14F-4D97-AF65-F5344CB8AC3E}">
-        <p14:creationId xmlns:p14="http://schemas.microsoft.com/office/powerpoint/2010/main" val="4020255319"/>
+        <p14:creationId xmlns:p14="http://schemas.microsoft.com/office/powerpoint/2010/main" val="4188328210"/>
       </p:ext>
     </p:extLst>
   </p:cSld>
@@ -1393,7 +1127,7 @@
           <a:p>
             <a:fld id="{71B8501F-095D-4FB7-9E41-AD32C3E49B00}" type="datetimeFigureOut">
               <a:rPr lang="en-GB" smtClean="0"/>
-              <a:t>08/08/2015</a:t>
+              <a:t>11/08/2015</a:t>
             </a:fld>
             <a:endParaRPr lang="en-GB"/>
           </a:p>
@@ -1444,7 +1178,7 @@
     </p:spTree>
     <p:extLst>
       <p:ext uri="{BB962C8B-B14F-4D97-AF65-F5344CB8AC3E}">
-        <p14:creationId xmlns:p14="http://schemas.microsoft.com/office/powerpoint/2010/main" val="224435457"/>
+        <p14:creationId xmlns:p14="http://schemas.microsoft.com/office/powerpoint/2010/main" val="2248635441"/>
       </p:ext>
     </p:extLst>
   </p:cSld>
@@ -1483,15 +1217,15 @@
         </p:nvSpPr>
         <p:spPr>
           <a:xfrm>
-            <a:off x="982514" y="1794830"/>
-            <a:ext cx="12420184" cy="2994714"/>
+            <a:off x="1228170" y="1076898"/>
+            <a:ext cx="15525572" cy="1796828"/>
           </a:xfrm>
         </p:spPr>
         <p:txBody>
           <a:bodyPr anchor="b"/>
           <a:lstStyle>
             <a:lvl1pPr>
-              <a:defRPr sz="6299"/>
+              <a:defRPr sz="3779"/>
             </a:lvl1pPr>
           </a:lstStyle>
           <a:p>
@@ -1515,8 +1249,8 @@
         </p:nvSpPr>
         <p:spPr>
           <a:xfrm>
-            <a:off x="982514" y="4817875"/>
-            <a:ext cx="12420184" cy="1574849"/>
+            <a:off x="1228170" y="2890725"/>
+            <a:ext cx="15525572" cy="944910"/>
           </a:xfrm>
         </p:spPr>
         <p:txBody>
@@ -1524,7 +1258,7 @@
           <a:lstStyle>
             <a:lvl1pPr marL="0" indent="0">
               <a:buNone/>
-              <a:defRPr sz="2520">
+              <a:defRPr sz="1512">
                 <a:solidFill>
                   <a:schemeClr val="tx1">
                     <a:tint val="75000"/>
@@ -1532,9 +1266,9 @@
                 </a:solidFill>
               </a:defRPr>
             </a:lvl1pPr>
-            <a:lvl2pPr marL="479969" indent="0">
-              <a:buNone/>
-              <a:defRPr sz="2100">
+            <a:lvl2pPr marL="287990" indent="0">
+              <a:buNone/>
+              <a:defRPr sz="1260">
                 <a:solidFill>
                   <a:schemeClr val="tx1">
                     <a:tint val="75000"/>
@@ -1542,9 +1276,9 @@
                 </a:solidFill>
               </a:defRPr>
             </a:lvl2pPr>
-            <a:lvl3pPr marL="959937" indent="0">
-              <a:buNone/>
-              <a:defRPr sz="1890">
+            <a:lvl3pPr marL="575981" indent="0">
+              <a:buNone/>
+              <a:defRPr sz="1134">
                 <a:solidFill>
                   <a:schemeClr val="tx1">
                     <a:tint val="75000"/>
@@ -1552,9 +1286,9 @@
                 </a:solidFill>
               </a:defRPr>
             </a:lvl3pPr>
-            <a:lvl4pPr marL="1439906" indent="0">
-              <a:buNone/>
-              <a:defRPr sz="1680">
+            <a:lvl4pPr marL="863971" indent="0">
+              <a:buNone/>
+              <a:defRPr sz="1008">
                 <a:solidFill>
                   <a:schemeClr val="tx1">
                     <a:tint val="75000"/>
@@ -1562,9 +1296,9 @@
                 </a:solidFill>
               </a:defRPr>
             </a:lvl4pPr>
-            <a:lvl5pPr marL="1919874" indent="0">
-              <a:buNone/>
-              <a:defRPr sz="1680">
+            <a:lvl5pPr marL="1151961" indent="0">
+              <a:buNone/>
+              <a:defRPr sz="1008">
                 <a:solidFill>
                   <a:schemeClr val="tx1">
                     <a:tint val="75000"/>
@@ -1572,9 +1306,9 @@
                 </a:solidFill>
               </a:defRPr>
             </a:lvl5pPr>
-            <a:lvl6pPr marL="2399843" indent="0">
-              <a:buNone/>
-              <a:defRPr sz="1680">
+            <a:lvl6pPr marL="1439951" indent="0">
+              <a:buNone/>
+              <a:defRPr sz="1008">
                 <a:solidFill>
                   <a:schemeClr val="tx1">
                     <a:tint val="75000"/>
@@ -1582,9 +1316,9 @@
                 </a:solidFill>
               </a:defRPr>
             </a:lvl6pPr>
-            <a:lvl7pPr marL="2879811" indent="0">
-              <a:buNone/>
-              <a:defRPr sz="1680">
+            <a:lvl7pPr marL="1727942" indent="0">
+              <a:buNone/>
+              <a:defRPr sz="1008">
                 <a:solidFill>
                   <a:schemeClr val="tx1">
                     <a:tint val="75000"/>
@@ -1592,9 +1326,9 @@
                 </a:solidFill>
               </a:defRPr>
             </a:lvl7pPr>
-            <a:lvl8pPr marL="3359780" indent="0">
-              <a:buNone/>
-              <a:defRPr sz="1680">
+            <a:lvl8pPr marL="2015932" indent="0">
+              <a:buNone/>
+              <a:defRPr sz="1008">
                 <a:solidFill>
                   <a:schemeClr val="tx1">
                     <a:tint val="75000"/>
@@ -1602,9 +1336,9 @@
                 </a:solidFill>
               </a:defRPr>
             </a:lvl8pPr>
-            <a:lvl9pPr marL="3839748" indent="0">
-              <a:buNone/>
-              <a:defRPr sz="1680">
+            <a:lvl9pPr marL="2303922" indent="0">
+              <a:buNone/>
+              <a:defRPr sz="1008">
                 <a:solidFill>
                   <a:schemeClr val="tx1">
                     <a:tint val="75000"/>
@@ -1639,7 +1373,7 @@
           <a:p>
             <a:fld id="{71B8501F-095D-4FB7-9E41-AD32C3E49B00}" type="datetimeFigureOut">
               <a:rPr lang="en-GB" smtClean="0"/>
-              <a:t>08/08/2015</a:t>
+              <a:t>11/08/2015</a:t>
             </a:fld>
             <a:endParaRPr lang="en-GB"/>
           </a:p>
@@ -1690,7 +1424,7 @@
     </p:spTree>
     <p:extLst>
       <p:ext uri="{BB962C8B-B14F-4D97-AF65-F5344CB8AC3E}">
-        <p14:creationId xmlns:p14="http://schemas.microsoft.com/office/powerpoint/2010/main" val="2935350157"/>
+        <p14:creationId xmlns:p14="http://schemas.microsoft.com/office/powerpoint/2010/main" val="1259190178"/>
       </p:ext>
     </p:extLst>
   </p:cSld>
@@ -1752,8 +1486,8 @@
         </p:nvSpPr>
         <p:spPr>
           <a:xfrm>
-            <a:off x="990014" y="1916484"/>
-            <a:ext cx="6120091" cy="4567898"/>
+            <a:off x="1237545" y="1149890"/>
+            <a:ext cx="7650282" cy="2740739"/>
           </a:xfrm>
         </p:spPr>
         <p:txBody>
@@ -1809,8 +1543,8 @@
         </p:nvSpPr>
         <p:spPr>
           <a:xfrm>
-            <a:off x="7290108" y="1916484"/>
-            <a:ext cx="6120091" cy="4567898"/>
+            <a:off x="9112836" y="1149890"/>
+            <a:ext cx="7650282" cy="2740739"/>
           </a:xfrm>
         </p:spPr>
         <p:txBody>
@@ -1871,7 +1605,7 @@
           <a:p>
             <a:fld id="{71B8501F-095D-4FB7-9E41-AD32C3E49B00}" type="datetimeFigureOut">
               <a:rPr lang="en-GB" smtClean="0"/>
-              <a:t>08/08/2015</a:t>
+              <a:t>11/08/2015</a:t>
             </a:fld>
             <a:endParaRPr lang="en-GB"/>
           </a:p>
@@ -1922,7 +1656,7 @@
     </p:spTree>
     <p:extLst>
       <p:ext uri="{BB962C8B-B14F-4D97-AF65-F5344CB8AC3E}">
-        <p14:creationId xmlns:p14="http://schemas.microsoft.com/office/powerpoint/2010/main" val="2628046594"/>
+        <p14:creationId xmlns:p14="http://schemas.microsoft.com/office/powerpoint/2010/main" val="476145946"/>
       </p:ext>
     </p:extLst>
   </p:cSld>
@@ -1961,8 +1695,8 @@
         </p:nvSpPr>
         <p:spPr>
           <a:xfrm>
-            <a:off x="991890" y="383297"/>
-            <a:ext cx="12420184" cy="1391534"/>
+            <a:off x="1239890" y="229978"/>
+            <a:ext cx="15525572" cy="834921"/>
           </a:xfrm>
         </p:spPr>
         <p:txBody>
@@ -1989,8 +1723,8 @@
         </p:nvSpPr>
         <p:spPr>
           <a:xfrm>
-            <a:off x="991891" y="1764832"/>
-            <a:ext cx="6091965" cy="864917"/>
+            <a:off x="1239891" y="1058899"/>
+            <a:ext cx="7615123" cy="518950"/>
           </a:xfrm>
         </p:spPr>
         <p:txBody>
@@ -1998,39 +1732,39 @@
           <a:lstStyle>
             <a:lvl1pPr marL="0" indent="0">
               <a:buNone/>
-              <a:defRPr sz="2520" b="1"/>
+              <a:defRPr sz="1512" b="1"/>
             </a:lvl1pPr>
-            <a:lvl2pPr marL="479969" indent="0">
-              <a:buNone/>
-              <a:defRPr sz="2100" b="1"/>
+            <a:lvl2pPr marL="287990" indent="0">
+              <a:buNone/>
+              <a:defRPr sz="1260" b="1"/>
             </a:lvl2pPr>
-            <a:lvl3pPr marL="959937" indent="0">
-              <a:buNone/>
-              <a:defRPr sz="1890" b="1"/>
+            <a:lvl3pPr marL="575981" indent="0">
+              <a:buNone/>
+              <a:defRPr sz="1134" b="1"/>
             </a:lvl3pPr>
-            <a:lvl4pPr marL="1439906" indent="0">
-              <a:buNone/>
-              <a:defRPr sz="1680" b="1"/>
+            <a:lvl4pPr marL="863971" indent="0">
+              <a:buNone/>
+              <a:defRPr sz="1008" b="1"/>
             </a:lvl4pPr>
-            <a:lvl5pPr marL="1919874" indent="0">
-              <a:buNone/>
-              <a:defRPr sz="1680" b="1"/>
+            <a:lvl5pPr marL="1151961" indent="0">
+              <a:buNone/>
+              <a:defRPr sz="1008" b="1"/>
             </a:lvl5pPr>
-            <a:lvl6pPr marL="2399843" indent="0">
-              <a:buNone/>
-              <a:defRPr sz="1680" b="1"/>
+            <a:lvl6pPr marL="1439951" indent="0">
+              <a:buNone/>
+              <a:defRPr sz="1008" b="1"/>
             </a:lvl6pPr>
-            <a:lvl7pPr marL="2879811" indent="0">
-              <a:buNone/>
-              <a:defRPr sz="1680" b="1"/>
+            <a:lvl7pPr marL="1727942" indent="0">
+              <a:buNone/>
+              <a:defRPr sz="1008" b="1"/>
             </a:lvl7pPr>
-            <a:lvl8pPr marL="3359780" indent="0">
-              <a:buNone/>
-              <a:defRPr sz="1680" b="1"/>
+            <a:lvl8pPr marL="2015932" indent="0">
+              <a:buNone/>
+              <a:defRPr sz="1008" b="1"/>
             </a:lvl8pPr>
-            <a:lvl9pPr marL="3839748" indent="0">
-              <a:buNone/>
-              <a:defRPr sz="1680" b="1"/>
+            <a:lvl9pPr marL="2303922" indent="0">
+              <a:buNone/>
+              <a:defRPr sz="1008" b="1"/>
             </a:lvl9pPr>
           </a:lstStyle>
           <a:p>
@@ -2054,8 +1788,8 @@
         </p:nvSpPr>
         <p:spPr>
           <a:xfrm>
-            <a:off x="991891" y="2629749"/>
-            <a:ext cx="6091965" cy="3867965"/>
+            <a:off x="1239891" y="1577849"/>
+            <a:ext cx="7615123" cy="2320779"/>
           </a:xfrm>
         </p:spPr>
         <p:txBody>
@@ -2111,8 +1845,8 @@
         </p:nvSpPr>
         <p:spPr>
           <a:xfrm>
-            <a:off x="7290108" y="1764832"/>
-            <a:ext cx="6121966" cy="864917"/>
+            <a:off x="9112836" y="1058899"/>
+            <a:ext cx="7652626" cy="518950"/>
           </a:xfrm>
         </p:spPr>
         <p:txBody>
@@ -2120,39 +1854,39 @@
           <a:lstStyle>
             <a:lvl1pPr marL="0" indent="0">
               <a:buNone/>
-              <a:defRPr sz="2520" b="1"/>
+              <a:defRPr sz="1512" b="1"/>
             </a:lvl1pPr>
-            <a:lvl2pPr marL="479969" indent="0">
-              <a:buNone/>
-              <a:defRPr sz="2100" b="1"/>
+            <a:lvl2pPr marL="287990" indent="0">
+              <a:buNone/>
+              <a:defRPr sz="1260" b="1"/>
             </a:lvl2pPr>
-            <a:lvl3pPr marL="959937" indent="0">
-              <a:buNone/>
-              <a:defRPr sz="1890" b="1"/>
+            <a:lvl3pPr marL="575981" indent="0">
+              <a:buNone/>
+              <a:defRPr sz="1134" b="1"/>
             </a:lvl3pPr>
-            <a:lvl4pPr marL="1439906" indent="0">
-              <a:buNone/>
-              <a:defRPr sz="1680" b="1"/>
+            <a:lvl4pPr marL="863971" indent="0">
+              <a:buNone/>
+              <a:defRPr sz="1008" b="1"/>
             </a:lvl4pPr>
-            <a:lvl5pPr marL="1919874" indent="0">
-              <a:buNone/>
-              <a:defRPr sz="1680" b="1"/>
+            <a:lvl5pPr marL="1151961" indent="0">
+              <a:buNone/>
+              <a:defRPr sz="1008" b="1"/>
             </a:lvl5pPr>
-            <a:lvl6pPr marL="2399843" indent="0">
-              <a:buNone/>
-              <a:defRPr sz="1680" b="1"/>
+            <a:lvl6pPr marL="1439951" indent="0">
+              <a:buNone/>
+              <a:defRPr sz="1008" b="1"/>
             </a:lvl6pPr>
-            <a:lvl7pPr marL="2879811" indent="0">
-              <a:buNone/>
-              <a:defRPr sz="1680" b="1"/>
+            <a:lvl7pPr marL="1727942" indent="0">
+              <a:buNone/>
+              <a:defRPr sz="1008" b="1"/>
             </a:lvl7pPr>
-            <a:lvl8pPr marL="3359780" indent="0">
-              <a:buNone/>
-              <a:defRPr sz="1680" b="1"/>
+            <a:lvl8pPr marL="2015932" indent="0">
+              <a:buNone/>
+              <a:defRPr sz="1008" b="1"/>
             </a:lvl8pPr>
-            <a:lvl9pPr marL="3839748" indent="0">
-              <a:buNone/>
-              <a:defRPr sz="1680" b="1"/>
+            <a:lvl9pPr marL="2303922" indent="0">
+              <a:buNone/>
+              <a:defRPr sz="1008" b="1"/>
             </a:lvl9pPr>
           </a:lstStyle>
           <a:p>
@@ -2176,8 +1910,8 @@
         </p:nvSpPr>
         <p:spPr>
           <a:xfrm>
-            <a:off x="7290108" y="2629749"/>
-            <a:ext cx="6121966" cy="3867965"/>
+            <a:off x="9112836" y="1577849"/>
+            <a:ext cx="7652626" cy="2320779"/>
           </a:xfrm>
         </p:spPr>
         <p:txBody>
@@ -2238,7 +1972,7 @@
           <a:p>
             <a:fld id="{71B8501F-095D-4FB7-9E41-AD32C3E49B00}" type="datetimeFigureOut">
               <a:rPr lang="en-GB" smtClean="0"/>
-              <a:t>08/08/2015</a:t>
+              <a:t>11/08/2015</a:t>
             </a:fld>
             <a:endParaRPr lang="en-GB"/>
           </a:p>
@@ -2289,7 +2023,7 @@
     </p:spTree>
     <p:extLst>
       <p:ext uri="{BB962C8B-B14F-4D97-AF65-F5344CB8AC3E}">
-        <p14:creationId xmlns:p14="http://schemas.microsoft.com/office/powerpoint/2010/main" val="1347684848"/>
+        <p14:creationId xmlns:p14="http://schemas.microsoft.com/office/powerpoint/2010/main" val="2224020958"/>
       </p:ext>
     </p:extLst>
   </p:cSld>
@@ -2356,7 +2090,7 @@
           <a:p>
             <a:fld id="{71B8501F-095D-4FB7-9E41-AD32C3E49B00}" type="datetimeFigureOut">
               <a:rPr lang="en-GB" smtClean="0"/>
-              <a:t>08/08/2015</a:t>
+              <a:t>11/08/2015</a:t>
             </a:fld>
             <a:endParaRPr lang="en-GB"/>
           </a:p>
@@ -2407,7 +2141,7 @@
     </p:spTree>
     <p:extLst>
       <p:ext uri="{BB962C8B-B14F-4D97-AF65-F5344CB8AC3E}">
-        <p14:creationId xmlns:p14="http://schemas.microsoft.com/office/powerpoint/2010/main" val="1603992370"/>
+        <p14:creationId xmlns:p14="http://schemas.microsoft.com/office/powerpoint/2010/main" val="1151002903"/>
       </p:ext>
     </p:extLst>
   </p:cSld>
@@ -2451,7 +2185,7 @@
           <a:p>
             <a:fld id="{71B8501F-095D-4FB7-9E41-AD32C3E49B00}" type="datetimeFigureOut">
               <a:rPr lang="en-GB" smtClean="0"/>
-              <a:t>08/08/2015</a:t>
+              <a:t>11/08/2015</a:t>
             </a:fld>
             <a:endParaRPr lang="en-GB"/>
           </a:p>
@@ -2502,7 +2236,7 @@
     </p:spTree>
     <p:extLst>
       <p:ext uri="{BB962C8B-B14F-4D97-AF65-F5344CB8AC3E}">
-        <p14:creationId xmlns:p14="http://schemas.microsoft.com/office/powerpoint/2010/main" val="2999521069"/>
+        <p14:creationId xmlns:p14="http://schemas.microsoft.com/office/powerpoint/2010/main" val="3774885408"/>
       </p:ext>
     </p:extLst>
   </p:cSld>
@@ -2541,15 +2275,15 @@
         </p:nvSpPr>
         <p:spPr>
           <a:xfrm>
-            <a:off x="991891" y="479954"/>
-            <a:ext cx="4644443" cy="1679840"/>
+            <a:off x="1239891" y="287972"/>
+            <a:ext cx="5805682" cy="1007904"/>
           </a:xfrm>
         </p:spPr>
         <p:txBody>
           <a:bodyPr anchor="b"/>
           <a:lstStyle>
             <a:lvl1pPr>
-              <a:defRPr sz="3359"/>
+              <a:defRPr sz="2016"/>
             </a:lvl1pPr>
           </a:lstStyle>
           <a:p>
@@ -2573,39 +2307,39 @@
         </p:nvSpPr>
         <p:spPr>
           <a:xfrm>
-            <a:off x="6121966" y="1036569"/>
-            <a:ext cx="7290108" cy="5116178"/>
+            <a:off x="7652626" y="621941"/>
+            <a:ext cx="9112836" cy="3069707"/>
           </a:xfrm>
         </p:spPr>
         <p:txBody>
           <a:bodyPr/>
           <a:lstStyle>
             <a:lvl1pPr>
-              <a:defRPr sz="3359"/>
+              <a:defRPr sz="2016"/>
             </a:lvl1pPr>
             <a:lvl2pPr>
-              <a:defRPr sz="2939"/>
+              <a:defRPr sz="1764"/>
             </a:lvl2pPr>
             <a:lvl3pPr>
-              <a:defRPr sz="2520"/>
+              <a:defRPr sz="1512"/>
             </a:lvl3pPr>
             <a:lvl4pPr>
-              <a:defRPr sz="2100"/>
+              <a:defRPr sz="1260"/>
             </a:lvl4pPr>
             <a:lvl5pPr>
-              <a:defRPr sz="2100"/>
+              <a:defRPr sz="1260"/>
             </a:lvl5pPr>
             <a:lvl6pPr>
-              <a:defRPr sz="2100"/>
+              <a:defRPr sz="1260"/>
             </a:lvl6pPr>
             <a:lvl7pPr>
-              <a:defRPr sz="2100"/>
+              <a:defRPr sz="1260"/>
             </a:lvl7pPr>
             <a:lvl8pPr>
-              <a:defRPr sz="2100"/>
+              <a:defRPr sz="1260"/>
             </a:lvl8pPr>
             <a:lvl9pPr>
-              <a:defRPr sz="2100"/>
+              <a:defRPr sz="1260"/>
             </a:lvl9pPr>
           </a:lstStyle>
           <a:p>
@@ -2658,8 +2392,8 @@
         </p:nvSpPr>
         <p:spPr>
           <a:xfrm>
-            <a:off x="991891" y="2159794"/>
-            <a:ext cx="4644443" cy="4001285"/>
+            <a:off x="1239891" y="1295877"/>
+            <a:ext cx="5805682" cy="2400771"/>
           </a:xfrm>
         </p:spPr>
         <p:txBody>
@@ -2667,39 +2401,39 @@
           <a:lstStyle>
             <a:lvl1pPr marL="0" indent="0">
               <a:buNone/>
-              <a:defRPr sz="1680"/>
+              <a:defRPr sz="1008"/>
             </a:lvl1pPr>
-            <a:lvl2pPr marL="479969" indent="0">
-              <a:buNone/>
-              <a:defRPr sz="1470"/>
+            <a:lvl2pPr marL="287990" indent="0">
+              <a:buNone/>
+              <a:defRPr sz="882"/>
             </a:lvl2pPr>
-            <a:lvl3pPr marL="959937" indent="0">
-              <a:buNone/>
-              <a:defRPr sz="1260"/>
+            <a:lvl3pPr marL="575981" indent="0">
+              <a:buNone/>
+              <a:defRPr sz="756"/>
             </a:lvl3pPr>
-            <a:lvl4pPr marL="1439906" indent="0">
-              <a:buNone/>
-              <a:defRPr sz="1050"/>
+            <a:lvl4pPr marL="863971" indent="0">
+              <a:buNone/>
+              <a:defRPr sz="630"/>
             </a:lvl4pPr>
-            <a:lvl5pPr marL="1919874" indent="0">
-              <a:buNone/>
-              <a:defRPr sz="1050"/>
+            <a:lvl5pPr marL="1151961" indent="0">
+              <a:buNone/>
+              <a:defRPr sz="630"/>
             </a:lvl5pPr>
-            <a:lvl6pPr marL="2399843" indent="0">
-              <a:buNone/>
-              <a:defRPr sz="1050"/>
+            <a:lvl6pPr marL="1439951" indent="0">
+              <a:buNone/>
+              <a:defRPr sz="630"/>
             </a:lvl6pPr>
-            <a:lvl7pPr marL="2879811" indent="0">
-              <a:buNone/>
-              <a:defRPr sz="1050"/>
+            <a:lvl7pPr marL="1727942" indent="0">
+              <a:buNone/>
+              <a:defRPr sz="630"/>
             </a:lvl7pPr>
-            <a:lvl8pPr marL="3359780" indent="0">
-              <a:buNone/>
-              <a:defRPr sz="1050"/>
+            <a:lvl8pPr marL="2015932" indent="0">
+              <a:buNone/>
+              <a:defRPr sz="630"/>
             </a:lvl8pPr>
-            <a:lvl9pPr marL="3839748" indent="0">
-              <a:buNone/>
-              <a:defRPr sz="1050"/>
+            <a:lvl9pPr marL="2303922" indent="0">
+              <a:buNone/>
+              <a:defRPr sz="630"/>
             </a:lvl9pPr>
           </a:lstStyle>
           <a:p>
@@ -2728,7 +2462,7 @@
           <a:p>
             <a:fld id="{71B8501F-095D-4FB7-9E41-AD32C3E49B00}" type="datetimeFigureOut">
               <a:rPr lang="en-GB" smtClean="0"/>
-              <a:t>08/08/2015</a:t>
+              <a:t>11/08/2015</a:t>
             </a:fld>
             <a:endParaRPr lang="en-GB"/>
           </a:p>
@@ -2779,7 +2513,7 @@
     </p:spTree>
     <p:extLst>
       <p:ext uri="{BB962C8B-B14F-4D97-AF65-F5344CB8AC3E}">
-        <p14:creationId xmlns:p14="http://schemas.microsoft.com/office/powerpoint/2010/main" val="1973467173"/>
+        <p14:creationId xmlns:p14="http://schemas.microsoft.com/office/powerpoint/2010/main" val="1698847117"/>
       </p:ext>
     </p:extLst>
   </p:cSld>
@@ -2818,15 +2552,15 @@
         </p:nvSpPr>
         <p:spPr>
           <a:xfrm>
-            <a:off x="991891" y="479954"/>
-            <a:ext cx="4644443" cy="1679840"/>
+            <a:off x="1239891" y="287972"/>
+            <a:ext cx="5805682" cy="1007904"/>
           </a:xfrm>
         </p:spPr>
         <p:txBody>
           <a:bodyPr anchor="b"/>
           <a:lstStyle>
             <a:lvl1pPr>
-              <a:defRPr sz="3359"/>
+              <a:defRPr sz="2016"/>
             </a:lvl1pPr>
           </a:lstStyle>
           <a:p>
@@ -2850,8 +2584,8 @@
         </p:nvSpPr>
         <p:spPr>
           <a:xfrm>
-            <a:off x="6121966" y="1036569"/>
-            <a:ext cx="7290108" cy="5116178"/>
+            <a:off x="7652626" y="621941"/>
+            <a:ext cx="9112836" cy="3069707"/>
           </a:xfrm>
         </p:spPr>
         <p:txBody>
@@ -2859,39 +2593,39 @@
           <a:lstStyle>
             <a:lvl1pPr marL="0" indent="0">
               <a:buNone/>
-              <a:defRPr sz="3359"/>
+              <a:defRPr sz="2016"/>
             </a:lvl1pPr>
-            <a:lvl2pPr marL="479969" indent="0">
-              <a:buNone/>
-              <a:defRPr sz="2939"/>
+            <a:lvl2pPr marL="287990" indent="0">
+              <a:buNone/>
+              <a:defRPr sz="1764"/>
             </a:lvl2pPr>
-            <a:lvl3pPr marL="959937" indent="0">
-              <a:buNone/>
-              <a:defRPr sz="2520"/>
+            <a:lvl3pPr marL="575981" indent="0">
+              <a:buNone/>
+              <a:defRPr sz="1512"/>
             </a:lvl3pPr>
-            <a:lvl4pPr marL="1439906" indent="0">
-              <a:buNone/>
-              <a:defRPr sz="2100"/>
+            <a:lvl4pPr marL="863971" indent="0">
+              <a:buNone/>
+              <a:defRPr sz="1260"/>
             </a:lvl4pPr>
-            <a:lvl5pPr marL="1919874" indent="0">
-              <a:buNone/>
-              <a:defRPr sz="2100"/>
+            <a:lvl5pPr marL="1151961" indent="0">
+              <a:buNone/>
+              <a:defRPr sz="1260"/>
             </a:lvl5pPr>
-            <a:lvl6pPr marL="2399843" indent="0">
-              <a:buNone/>
-              <a:defRPr sz="2100"/>
+            <a:lvl6pPr marL="1439951" indent="0">
+              <a:buNone/>
+              <a:defRPr sz="1260"/>
             </a:lvl6pPr>
-            <a:lvl7pPr marL="2879811" indent="0">
-              <a:buNone/>
-              <a:defRPr sz="2100"/>
+            <a:lvl7pPr marL="1727942" indent="0">
+              <a:buNone/>
+              <a:defRPr sz="1260"/>
             </a:lvl7pPr>
-            <a:lvl8pPr marL="3359780" indent="0">
-              <a:buNone/>
-              <a:defRPr sz="2100"/>
+            <a:lvl8pPr marL="2015932" indent="0">
+              <a:buNone/>
+              <a:defRPr sz="1260"/>
             </a:lvl8pPr>
-            <a:lvl9pPr marL="3839748" indent="0">
-              <a:buNone/>
-              <a:defRPr sz="2100"/>
+            <a:lvl9pPr marL="2303922" indent="0">
+              <a:buNone/>
+              <a:defRPr sz="1260"/>
             </a:lvl9pPr>
           </a:lstStyle>
           <a:p>
@@ -2915,8 +2649,8 @@
         </p:nvSpPr>
         <p:spPr>
           <a:xfrm>
-            <a:off x="991891" y="2159794"/>
-            <a:ext cx="4644443" cy="4001285"/>
+            <a:off x="1239891" y="1295877"/>
+            <a:ext cx="5805682" cy="2400771"/>
           </a:xfrm>
         </p:spPr>
         <p:txBody>
@@ -2924,39 +2658,39 @@
           <a:lstStyle>
             <a:lvl1pPr marL="0" indent="0">
               <a:buNone/>
-              <a:defRPr sz="1680"/>
+              <a:defRPr sz="1008"/>
             </a:lvl1pPr>
-            <a:lvl2pPr marL="479969" indent="0">
-              <a:buNone/>
-              <a:defRPr sz="1470"/>
+            <a:lvl2pPr marL="287990" indent="0">
+              <a:buNone/>
+              <a:defRPr sz="882"/>
             </a:lvl2pPr>
-            <a:lvl3pPr marL="959937" indent="0">
-              <a:buNone/>
-              <a:defRPr sz="1260"/>
+            <a:lvl3pPr marL="575981" indent="0">
+              <a:buNone/>
+              <a:defRPr sz="756"/>
             </a:lvl3pPr>
-            <a:lvl4pPr marL="1439906" indent="0">
-              <a:buNone/>
-              <a:defRPr sz="1050"/>
+            <a:lvl4pPr marL="863971" indent="0">
+              <a:buNone/>
+              <a:defRPr sz="630"/>
             </a:lvl4pPr>
-            <a:lvl5pPr marL="1919874" indent="0">
-              <a:buNone/>
-              <a:defRPr sz="1050"/>
+            <a:lvl5pPr marL="1151961" indent="0">
+              <a:buNone/>
+              <a:defRPr sz="630"/>
             </a:lvl5pPr>
-            <a:lvl6pPr marL="2399843" indent="0">
-              <a:buNone/>
-              <a:defRPr sz="1050"/>
+            <a:lvl6pPr marL="1439951" indent="0">
+              <a:buNone/>
+              <a:defRPr sz="630"/>
             </a:lvl6pPr>
-            <a:lvl7pPr marL="2879811" indent="0">
-              <a:buNone/>
-              <a:defRPr sz="1050"/>
+            <a:lvl7pPr marL="1727942" indent="0">
+              <a:buNone/>
+              <a:defRPr sz="630"/>
             </a:lvl7pPr>
-            <a:lvl8pPr marL="3359780" indent="0">
-              <a:buNone/>
-              <a:defRPr sz="1050"/>
+            <a:lvl8pPr marL="2015932" indent="0">
+              <a:buNone/>
+              <a:defRPr sz="630"/>
             </a:lvl8pPr>
-            <a:lvl9pPr marL="3839748" indent="0">
-              <a:buNone/>
-              <a:defRPr sz="1050"/>
+            <a:lvl9pPr marL="2303922" indent="0">
+              <a:buNone/>
+              <a:defRPr sz="630"/>
             </a:lvl9pPr>
           </a:lstStyle>
           <a:p>
@@ -2985,7 +2719,7 @@
           <a:p>
             <a:fld id="{71B8501F-095D-4FB7-9E41-AD32C3E49B00}" type="datetimeFigureOut">
               <a:rPr lang="en-GB" smtClean="0"/>
-              <a:t>08/08/2015</a:t>
+              <a:t>11/08/2015</a:t>
             </a:fld>
             <a:endParaRPr lang="en-GB"/>
           </a:p>
@@ -3036,7 +2770,7 @@
     </p:spTree>
     <p:extLst>
       <p:ext uri="{BB962C8B-B14F-4D97-AF65-F5344CB8AC3E}">
-        <p14:creationId xmlns:p14="http://schemas.microsoft.com/office/powerpoint/2010/main" val="3911944682"/>
+        <p14:creationId xmlns:p14="http://schemas.microsoft.com/office/powerpoint/2010/main" val="1164732887"/>
       </p:ext>
     </p:extLst>
   </p:cSld>
@@ -3080,8 +2814,8 @@
         </p:nvSpPr>
         <p:spPr>
           <a:xfrm>
-            <a:off x="990015" y="383297"/>
-            <a:ext cx="12420184" cy="1391534"/>
+            <a:off x="1237546" y="229978"/>
+            <a:ext cx="15525572" cy="834921"/>
           </a:xfrm>
           <a:prstGeom prst="rect">
             <a:avLst/>
@@ -3113,8 +2847,8 @@
         </p:nvSpPr>
         <p:spPr>
           <a:xfrm>
-            <a:off x="990015" y="1916484"/>
-            <a:ext cx="12420184" cy="4567898"/>
+            <a:off x="1237546" y="1149890"/>
+            <a:ext cx="15525572" cy="2740739"/>
           </a:xfrm>
           <a:prstGeom prst="rect">
             <a:avLst/>
@@ -3175,8 +2909,8 @@
         </p:nvSpPr>
         <p:spPr>
           <a:xfrm>
-            <a:off x="990015" y="6672697"/>
-            <a:ext cx="3240048" cy="383297"/>
+            <a:off x="1237546" y="4003618"/>
+            <a:ext cx="4050149" cy="229978"/>
           </a:xfrm>
           <a:prstGeom prst="rect">
             <a:avLst/>
@@ -3186,7 +2920,7 @@
           <a:bodyPr vert="horz" lIns="91440" tIns="45720" rIns="91440" bIns="45720" rtlCol="0" anchor="ctr"/>
           <a:lstStyle>
             <a:lvl1pPr algn="l">
-              <a:defRPr sz="1260">
+              <a:defRPr sz="756">
                 <a:solidFill>
                   <a:schemeClr val="tx1">
                     <a:tint val="75000"/>
@@ -3198,7 +2932,7 @@
           <a:p>
             <a:fld id="{71B8501F-095D-4FB7-9E41-AD32C3E49B00}" type="datetimeFigureOut">
               <a:rPr lang="en-GB" smtClean="0"/>
-              <a:t>08/08/2015</a:t>
+              <a:t>11/08/2015</a:t>
             </a:fld>
             <a:endParaRPr lang="en-GB"/>
           </a:p>
@@ -3216,8 +2950,8 @@
         </p:nvSpPr>
         <p:spPr>
           <a:xfrm>
-            <a:off x="4770071" y="6672697"/>
-            <a:ext cx="4860072" cy="383297"/>
+            <a:off x="5962720" y="4003618"/>
+            <a:ext cx="6075224" cy="229978"/>
           </a:xfrm>
           <a:prstGeom prst="rect">
             <a:avLst/>
@@ -3227,7 +2961,7 @@
           <a:bodyPr vert="horz" lIns="91440" tIns="45720" rIns="91440" bIns="45720" rtlCol="0" anchor="ctr"/>
           <a:lstStyle>
             <a:lvl1pPr algn="ctr">
-              <a:defRPr sz="1260">
+              <a:defRPr sz="756">
                 <a:solidFill>
                   <a:schemeClr val="tx1">
                     <a:tint val="75000"/>
@@ -3253,8 +2987,8 @@
         </p:nvSpPr>
         <p:spPr>
           <a:xfrm>
-            <a:off x="10170150" y="6672697"/>
-            <a:ext cx="3240048" cy="383297"/>
+            <a:off x="12712968" y="4003618"/>
+            <a:ext cx="4050149" cy="229978"/>
           </a:xfrm>
           <a:prstGeom prst="rect">
             <a:avLst/>
@@ -3264,7 +2998,7 @@
           <a:bodyPr vert="horz" lIns="91440" tIns="45720" rIns="91440" bIns="45720" rtlCol="0" anchor="ctr"/>
           <a:lstStyle>
             <a:lvl1pPr algn="r">
-              <a:defRPr sz="1260">
+              <a:defRPr sz="756">
                 <a:solidFill>
                   <a:schemeClr val="tx1">
                     <a:tint val="75000"/>
@@ -3285,27 +3019,27 @@
     </p:spTree>
     <p:extLst>
       <p:ext uri="{BB962C8B-B14F-4D97-AF65-F5344CB8AC3E}">
-        <p14:creationId xmlns:p14="http://schemas.microsoft.com/office/powerpoint/2010/main" val="4172699290"/>
+        <p14:creationId xmlns:p14="http://schemas.microsoft.com/office/powerpoint/2010/main" val="2228854452"/>
       </p:ext>
     </p:extLst>
   </p:cSld>
   <p:clrMap bg1="lt1" tx1="dk1" bg2="lt2" tx2="dk2" accent1="accent1" accent2="accent2" accent3="accent3" accent4="accent4" accent5="accent5" accent6="accent6" hlink="hlink" folHlink="folHlink"/>
   <p:sldLayoutIdLst>
-    <p:sldLayoutId id="2147483697" r:id="rId1"/>
-    <p:sldLayoutId id="2147483698" r:id="rId2"/>
-    <p:sldLayoutId id="2147483699" r:id="rId3"/>
-    <p:sldLayoutId id="2147483700" r:id="rId4"/>
-    <p:sldLayoutId id="2147483701" r:id="rId5"/>
-    <p:sldLayoutId id="2147483702" r:id="rId6"/>
-    <p:sldLayoutId id="2147483703" r:id="rId7"/>
-    <p:sldLayoutId id="2147483704" r:id="rId8"/>
-    <p:sldLayoutId id="2147483705" r:id="rId9"/>
-    <p:sldLayoutId id="2147483706" r:id="rId10"/>
-    <p:sldLayoutId id="2147483707" r:id="rId11"/>
+    <p:sldLayoutId id="2147483721" r:id="rId1"/>
+    <p:sldLayoutId id="2147483722" r:id="rId2"/>
+    <p:sldLayoutId id="2147483723" r:id="rId3"/>
+    <p:sldLayoutId id="2147483724" r:id="rId4"/>
+    <p:sldLayoutId id="2147483725" r:id="rId5"/>
+    <p:sldLayoutId id="2147483726" r:id="rId6"/>
+    <p:sldLayoutId id="2147483727" r:id="rId7"/>
+    <p:sldLayoutId id="2147483728" r:id="rId8"/>
+    <p:sldLayoutId id="2147483729" r:id="rId9"/>
+    <p:sldLayoutId id="2147483730" r:id="rId10"/>
+    <p:sldLayoutId id="2147483731" r:id="rId11"/>
   </p:sldLayoutIdLst>
   <p:txStyles>
     <p:titleStyle>
-      <a:lvl1pPr algn="l" defTabSz="959937" rtl="0" eaLnBrk="1" latinLnBrk="0" hangingPunct="1">
+      <a:lvl1pPr algn="l" defTabSz="575981" rtl="0" eaLnBrk="1" latinLnBrk="0" hangingPunct="1">
         <a:lnSpc>
           <a:spcPct val="90000"/>
         </a:lnSpc>
@@ -3313,7 +3047,7 @@
           <a:spcPct val="0"/>
         </a:spcBef>
         <a:buNone/>
-        <a:defRPr sz="4619" kern="1200">
+        <a:defRPr sz="2772" kern="1200">
           <a:solidFill>
             <a:schemeClr val="tx1"/>
           </a:solidFill>
@@ -3324,16 +3058,16 @@
       </a:lvl1pPr>
     </p:titleStyle>
     <p:bodyStyle>
-      <a:lvl1pPr marL="239984" indent="-239984" algn="l" defTabSz="959937" rtl="0" eaLnBrk="1" latinLnBrk="0" hangingPunct="1">
+      <a:lvl1pPr marL="143995" indent="-143995" algn="l" defTabSz="575981" rtl="0" eaLnBrk="1" latinLnBrk="0" hangingPunct="1">
         <a:lnSpc>
           <a:spcPct val="90000"/>
         </a:lnSpc>
         <a:spcBef>
-          <a:spcPts val="1050"/>
+          <a:spcPts val="630"/>
         </a:spcBef>
         <a:buFont typeface="Arial" panose="020B0604020202020204" pitchFamily="34" charset="0"/>
         <a:buChar char="•"/>
-        <a:defRPr sz="2939" kern="1200">
+        <a:defRPr sz="1764" kern="1200">
           <a:solidFill>
             <a:schemeClr val="tx1"/>
           </a:solidFill>
@@ -3342,16 +3076,16 @@
           <a:cs typeface="+mn-cs"/>
         </a:defRPr>
       </a:lvl1pPr>
-      <a:lvl2pPr marL="719953" indent="-239984" algn="l" defTabSz="959937" rtl="0" eaLnBrk="1" latinLnBrk="0" hangingPunct="1">
+      <a:lvl2pPr marL="431985" indent="-143995" algn="l" defTabSz="575981" rtl="0" eaLnBrk="1" latinLnBrk="0" hangingPunct="1">
         <a:lnSpc>
           <a:spcPct val="90000"/>
         </a:lnSpc>
         <a:spcBef>
-          <a:spcPts val="525"/>
+          <a:spcPts val="315"/>
         </a:spcBef>
         <a:buFont typeface="Arial" panose="020B0604020202020204" pitchFamily="34" charset="0"/>
         <a:buChar char="•"/>
-        <a:defRPr sz="2520" kern="1200">
+        <a:defRPr sz="1512" kern="1200">
           <a:solidFill>
             <a:schemeClr val="tx1"/>
           </a:solidFill>
@@ -3360,16 +3094,16 @@
           <a:cs typeface="+mn-cs"/>
         </a:defRPr>
       </a:lvl2pPr>
-      <a:lvl3pPr marL="1199921" indent="-239984" algn="l" defTabSz="959937" rtl="0" eaLnBrk="1" latinLnBrk="0" hangingPunct="1">
+      <a:lvl3pPr marL="719976" indent="-143995" algn="l" defTabSz="575981" rtl="0" eaLnBrk="1" latinLnBrk="0" hangingPunct="1">
         <a:lnSpc>
           <a:spcPct val="90000"/>
         </a:lnSpc>
         <a:spcBef>
-          <a:spcPts val="525"/>
+          <a:spcPts val="315"/>
         </a:spcBef>
         <a:buFont typeface="Arial" panose="020B0604020202020204" pitchFamily="34" charset="0"/>
         <a:buChar char="•"/>
-        <a:defRPr sz="2100" kern="1200">
+        <a:defRPr sz="1260" kern="1200">
           <a:solidFill>
             <a:schemeClr val="tx1"/>
           </a:solidFill>
@@ -3378,16 +3112,16 @@
           <a:cs typeface="+mn-cs"/>
         </a:defRPr>
       </a:lvl3pPr>
-      <a:lvl4pPr marL="1679890" indent="-239984" algn="l" defTabSz="959937" rtl="0" eaLnBrk="1" latinLnBrk="0" hangingPunct="1">
+      <a:lvl4pPr marL="1007966" indent="-143995" algn="l" defTabSz="575981" rtl="0" eaLnBrk="1" latinLnBrk="0" hangingPunct="1">
         <a:lnSpc>
           <a:spcPct val="90000"/>
         </a:lnSpc>
         <a:spcBef>
-          <a:spcPts val="525"/>
+          <a:spcPts val="315"/>
         </a:spcBef>
         <a:buFont typeface="Arial" panose="020B0604020202020204" pitchFamily="34" charset="0"/>
         <a:buChar char="•"/>
-        <a:defRPr sz="1890" kern="1200">
+        <a:defRPr sz="1134" kern="1200">
           <a:solidFill>
             <a:schemeClr val="tx1"/>
           </a:solidFill>
@@ -3396,16 +3130,16 @@
           <a:cs typeface="+mn-cs"/>
         </a:defRPr>
       </a:lvl4pPr>
-      <a:lvl5pPr marL="2159859" indent="-239984" algn="l" defTabSz="959937" rtl="0" eaLnBrk="1" latinLnBrk="0" hangingPunct="1">
+      <a:lvl5pPr marL="1295956" indent="-143995" algn="l" defTabSz="575981" rtl="0" eaLnBrk="1" latinLnBrk="0" hangingPunct="1">
         <a:lnSpc>
           <a:spcPct val="90000"/>
         </a:lnSpc>
         <a:spcBef>
-          <a:spcPts val="525"/>
+          <a:spcPts val="315"/>
         </a:spcBef>
         <a:buFont typeface="Arial" panose="020B0604020202020204" pitchFamily="34" charset="0"/>
         <a:buChar char="•"/>
-        <a:defRPr sz="1890" kern="1200">
+        <a:defRPr sz="1134" kern="1200">
           <a:solidFill>
             <a:schemeClr val="tx1"/>
           </a:solidFill>
@@ -3414,16 +3148,16 @@
           <a:cs typeface="+mn-cs"/>
         </a:defRPr>
       </a:lvl5pPr>
-      <a:lvl6pPr marL="2639827" indent="-239984" algn="l" defTabSz="959937" rtl="0" eaLnBrk="1" latinLnBrk="0" hangingPunct="1">
+      <a:lvl6pPr marL="1583947" indent="-143995" algn="l" defTabSz="575981" rtl="0" eaLnBrk="1" latinLnBrk="0" hangingPunct="1">
         <a:lnSpc>
           <a:spcPct val="90000"/>
         </a:lnSpc>
         <a:spcBef>
-          <a:spcPts val="525"/>
+          <a:spcPts val="315"/>
         </a:spcBef>
         <a:buFont typeface="Arial" panose="020B0604020202020204" pitchFamily="34" charset="0"/>
         <a:buChar char="•"/>
-        <a:defRPr sz="1890" kern="1200">
+        <a:defRPr sz="1134" kern="1200">
           <a:solidFill>
             <a:schemeClr val="tx1"/>
           </a:solidFill>
@@ -3432,16 +3166,16 @@
           <a:cs typeface="+mn-cs"/>
         </a:defRPr>
       </a:lvl6pPr>
-      <a:lvl7pPr marL="3119796" indent="-239984" algn="l" defTabSz="959937" rtl="0" eaLnBrk="1" latinLnBrk="0" hangingPunct="1">
+      <a:lvl7pPr marL="1871937" indent="-143995" algn="l" defTabSz="575981" rtl="0" eaLnBrk="1" latinLnBrk="0" hangingPunct="1">
         <a:lnSpc>
           <a:spcPct val="90000"/>
         </a:lnSpc>
         <a:spcBef>
-          <a:spcPts val="525"/>
+          <a:spcPts val="315"/>
         </a:spcBef>
         <a:buFont typeface="Arial" panose="020B0604020202020204" pitchFamily="34" charset="0"/>
         <a:buChar char="•"/>
-        <a:defRPr sz="1890" kern="1200">
+        <a:defRPr sz="1134" kern="1200">
           <a:solidFill>
             <a:schemeClr val="tx1"/>
           </a:solidFill>
@@ -3450,16 +3184,16 @@
           <a:cs typeface="+mn-cs"/>
         </a:defRPr>
       </a:lvl7pPr>
-      <a:lvl8pPr marL="3599764" indent="-239984" algn="l" defTabSz="959937" rtl="0" eaLnBrk="1" latinLnBrk="0" hangingPunct="1">
+      <a:lvl8pPr marL="2159927" indent="-143995" algn="l" defTabSz="575981" rtl="0" eaLnBrk="1" latinLnBrk="0" hangingPunct="1">
         <a:lnSpc>
           <a:spcPct val="90000"/>
         </a:lnSpc>
         <a:spcBef>
-          <a:spcPts val="525"/>
+          <a:spcPts val="315"/>
         </a:spcBef>
         <a:buFont typeface="Arial" panose="020B0604020202020204" pitchFamily="34" charset="0"/>
         <a:buChar char="•"/>
-        <a:defRPr sz="1890" kern="1200">
+        <a:defRPr sz="1134" kern="1200">
           <a:solidFill>
             <a:schemeClr val="tx1"/>
           </a:solidFill>
@@ -3468,16 +3202,16 @@
           <a:cs typeface="+mn-cs"/>
         </a:defRPr>
       </a:lvl8pPr>
-      <a:lvl9pPr marL="4079733" indent="-239984" algn="l" defTabSz="959937" rtl="0" eaLnBrk="1" latinLnBrk="0" hangingPunct="1">
+      <a:lvl9pPr marL="2447917" indent="-143995" algn="l" defTabSz="575981" rtl="0" eaLnBrk="1" latinLnBrk="0" hangingPunct="1">
         <a:lnSpc>
           <a:spcPct val="90000"/>
         </a:lnSpc>
         <a:spcBef>
-          <a:spcPts val="525"/>
+          <a:spcPts val="315"/>
         </a:spcBef>
         <a:buFont typeface="Arial" panose="020B0604020202020204" pitchFamily="34" charset="0"/>
         <a:buChar char="•"/>
-        <a:defRPr sz="1890" kern="1200">
+        <a:defRPr sz="1134" kern="1200">
           <a:solidFill>
             <a:schemeClr val="tx1"/>
           </a:solidFill>
@@ -3491,8 +3225,8 @@
       <a:defPPr>
         <a:defRPr lang="en-US"/>
       </a:defPPr>
-      <a:lvl1pPr marL="0" algn="l" defTabSz="959937" rtl="0" eaLnBrk="1" latinLnBrk="0" hangingPunct="1">
-        <a:defRPr sz="1890" kern="1200">
+      <a:lvl1pPr marL="0" algn="l" defTabSz="575981" rtl="0" eaLnBrk="1" latinLnBrk="0" hangingPunct="1">
+        <a:defRPr sz="1134" kern="1200">
           <a:solidFill>
             <a:schemeClr val="tx1"/>
           </a:solidFill>
@@ -3501,8 +3235,8 @@
           <a:cs typeface="+mn-cs"/>
         </a:defRPr>
       </a:lvl1pPr>
-      <a:lvl2pPr marL="479969" algn="l" defTabSz="959937" rtl="0" eaLnBrk="1" latinLnBrk="0" hangingPunct="1">
-        <a:defRPr sz="1890" kern="1200">
+      <a:lvl2pPr marL="287990" algn="l" defTabSz="575981" rtl="0" eaLnBrk="1" latinLnBrk="0" hangingPunct="1">
+        <a:defRPr sz="1134" kern="1200">
           <a:solidFill>
             <a:schemeClr val="tx1"/>
           </a:solidFill>
@@ -3511,8 +3245,8 @@
           <a:cs typeface="+mn-cs"/>
         </a:defRPr>
       </a:lvl2pPr>
-      <a:lvl3pPr marL="959937" algn="l" defTabSz="959937" rtl="0" eaLnBrk="1" latinLnBrk="0" hangingPunct="1">
-        <a:defRPr sz="1890" kern="1200">
+      <a:lvl3pPr marL="575981" algn="l" defTabSz="575981" rtl="0" eaLnBrk="1" latinLnBrk="0" hangingPunct="1">
+        <a:defRPr sz="1134" kern="1200">
           <a:solidFill>
             <a:schemeClr val="tx1"/>
           </a:solidFill>
@@ -3521,8 +3255,8 @@
           <a:cs typeface="+mn-cs"/>
         </a:defRPr>
       </a:lvl3pPr>
-      <a:lvl4pPr marL="1439906" algn="l" defTabSz="959937" rtl="0" eaLnBrk="1" latinLnBrk="0" hangingPunct="1">
-        <a:defRPr sz="1890" kern="1200">
+      <a:lvl4pPr marL="863971" algn="l" defTabSz="575981" rtl="0" eaLnBrk="1" latinLnBrk="0" hangingPunct="1">
+        <a:defRPr sz="1134" kern="1200">
           <a:solidFill>
             <a:schemeClr val="tx1"/>
           </a:solidFill>
@@ -3531,8 +3265,8 @@
           <a:cs typeface="+mn-cs"/>
         </a:defRPr>
       </a:lvl4pPr>
-      <a:lvl5pPr marL="1919874" algn="l" defTabSz="959937" rtl="0" eaLnBrk="1" latinLnBrk="0" hangingPunct="1">
-        <a:defRPr sz="1890" kern="1200">
+      <a:lvl5pPr marL="1151961" algn="l" defTabSz="575981" rtl="0" eaLnBrk="1" latinLnBrk="0" hangingPunct="1">
+        <a:defRPr sz="1134" kern="1200">
           <a:solidFill>
             <a:schemeClr val="tx1"/>
           </a:solidFill>
@@ -3541,8 +3275,8 @@
           <a:cs typeface="+mn-cs"/>
         </a:defRPr>
       </a:lvl5pPr>
-      <a:lvl6pPr marL="2399843" algn="l" defTabSz="959937" rtl="0" eaLnBrk="1" latinLnBrk="0" hangingPunct="1">
-        <a:defRPr sz="1890" kern="1200">
+      <a:lvl6pPr marL="1439951" algn="l" defTabSz="575981" rtl="0" eaLnBrk="1" latinLnBrk="0" hangingPunct="1">
+        <a:defRPr sz="1134" kern="1200">
           <a:solidFill>
             <a:schemeClr val="tx1"/>
           </a:solidFill>
@@ -3551,8 +3285,8 @@
           <a:cs typeface="+mn-cs"/>
         </a:defRPr>
       </a:lvl6pPr>
-      <a:lvl7pPr marL="2879811" algn="l" defTabSz="959937" rtl="0" eaLnBrk="1" latinLnBrk="0" hangingPunct="1">
-        <a:defRPr sz="1890" kern="1200">
+      <a:lvl7pPr marL="1727942" algn="l" defTabSz="575981" rtl="0" eaLnBrk="1" latinLnBrk="0" hangingPunct="1">
+        <a:defRPr sz="1134" kern="1200">
           <a:solidFill>
             <a:schemeClr val="tx1"/>
           </a:solidFill>
@@ -3561,8 +3295,8 @@
           <a:cs typeface="+mn-cs"/>
         </a:defRPr>
       </a:lvl7pPr>
-      <a:lvl8pPr marL="3359780" algn="l" defTabSz="959937" rtl="0" eaLnBrk="1" latinLnBrk="0" hangingPunct="1">
-        <a:defRPr sz="1890" kern="1200">
+      <a:lvl8pPr marL="2015932" algn="l" defTabSz="575981" rtl="0" eaLnBrk="1" latinLnBrk="0" hangingPunct="1">
+        <a:defRPr sz="1134" kern="1200">
           <a:solidFill>
             <a:schemeClr val="tx1"/>
           </a:solidFill>
@@ -3571,8 +3305,8 @@
           <a:cs typeface="+mn-cs"/>
         </a:defRPr>
       </a:lvl8pPr>
-      <a:lvl9pPr marL="3839748" algn="l" defTabSz="959937" rtl="0" eaLnBrk="1" latinLnBrk="0" hangingPunct="1">
-        <a:defRPr sz="1890" kern="1200">
+      <a:lvl9pPr marL="2303922" algn="l" defTabSz="575981" rtl="0" eaLnBrk="1" latinLnBrk="0" hangingPunct="1">
+        <a:defRPr sz="1134" kern="1200">
           <a:solidFill>
             <a:schemeClr val="tx1"/>
           </a:solidFill>
@@ -3605,6 +3339,30 @@
       </p:grpSpPr>
       <p:pic>
         <p:nvPicPr>
+          <p:cNvPr id="8" name="Picture 7"/>
+          <p:cNvPicPr>
+            <a:picLocks noChangeAspect="1"/>
+          </p:cNvPicPr>
+          <p:nvPr/>
+        </p:nvPicPr>
+        <p:blipFill>
+          <a:blip r:embed="rId2"/>
+          <a:stretch>
+            <a:fillRect/>
+          </a:stretch>
+        </p:blipFill>
+        <p:spPr>
+          <a:xfrm>
+            <a:off x="7224081" y="341313"/>
+            <a:ext cx="3505200" cy="3638550"/>
+          </a:xfrm>
+          <a:prstGeom prst="rect">
+            <a:avLst/>
+          </a:prstGeom>
+        </p:spPr>
+      </p:pic>
+      <p:pic>
+        <p:nvPicPr>
           <p:cNvPr id="9" name="Picture 8"/>
           <p:cNvPicPr>
             <a:picLocks noChangeAspect="1"/>
@@ -3619,8 +3377,8 @@
         </p:blipFill>
         <p:spPr>
           <a:xfrm>
-            <a:off x="2919423" y="450"/>
-            <a:ext cx="3468063" cy="3600000"/>
+            <a:off x="10810379" y="341313"/>
+            <a:ext cx="3505200" cy="3638550"/>
           </a:xfrm>
           <a:prstGeom prst="rect">
             <a:avLst/>
@@ -3629,7 +3387,7 @@
       </p:pic>
       <p:pic>
         <p:nvPicPr>
-          <p:cNvPr id="6" name="Picture 5"/>
+          <p:cNvPr id="10" name="Picture 9"/>
           <p:cNvPicPr>
             <a:picLocks noChangeAspect="1"/>
           </p:cNvPicPr>
@@ -3643,47 +3401,17 @@
         </p:blipFill>
         <p:spPr>
           <a:xfrm>
-            <a:off x="1" y="0"/>
-            <a:ext cx="3468063" cy="3600000"/>
+            <a:off x="14396679" y="341313"/>
+            <a:ext cx="3505200" cy="3638550"/>
           </a:xfrm>
           <a:prstGeom prst="rect">
             <a:avLst/>
           </a:prstGeom>
         </p:spPr>
       </p:pic>
-      <p:sp>
-        <p:nvSpPr>
-          <p:cNvPr id="7" name="TextBox 6"/>
-          <p:cNvSpPr txBox="1"/>
-          <p:nvPr/>
-        </p:nvSpPr>
-        <p:spPr>
-          <a:xfrm>
-            <a:off x="2353056" y="463296"/>
-            <a:ext cx="758541" cy="369332"/>
-          </a:xfrm>
-          <a:prstGeom prst="rect">
-            <a:avLst/>
-          </a:prstGeom>
-          <a:noFill/>
-        </p:spPr>
-        <p:txBody>
-          <a:bodyPr wrap="none" rtlCol="0">
-            <a:spAutoFit/>
-          </a:bodyPr>
-          <a:lstStyle/>
-          <a:p>
-            <a:r>
-              <a:rPr lang="en-GB" dirty="0" smtClean="0"/>
-              <a:t>3.69%</a:t>
-            </a:r>
-            <a:endParaRPr lang="en-GB" dirty="0"/>
-          </a:p>
-        </p:txBody>
-      </p:sp>
       <p:pic>
         <p:nvPicPr>
-          <p:cNvPr id="8" name="Picture 7"/>
+          <p:cNvPr id="11" name="Picture 10"/>
           <p:cNvPicPr>
             <a:picLocks noChangeAspect="1"/>
           </p:cNvPicPr>
@@ -3697,92 +3425,32 @@
         </p:blipFill>
         <p:spPr>
           <a:xfrm>
-            <a:off x="0" y="3599313"/>
-            <a:ext cx="3468063" cy="3600000"/>
+            <a:off x="3637783" y="341313"/>
+            <a:ext cx="3505200" cy="3638550"/>
           </a:xfrm>
           <a:prstGeom prst="rect">
             <a:avLst/>
           </a:prstGeom>
         </p:spPr>
       </p:pic>
-      <p:sp>
-        <p:nvSpPr>
-          <p:cNvPr id="10" name="TextBox 9"/>
-          <p:cNvSpPr txBox="1"/>
-          <p:nvPr/>
-        </p:nvSpPr>
-        <p:spPr>
-          <a:xfrm>
-            <a:off x="5256528" y="463296"/>
-            <a:ext cx="593432" cy="369332"/>
-          </a:xfrm>
-          <a:prstGeom prst="rect">
-            <a:avLst/>
-          </a:prstGeom>
-          <a:noFill/>
-        </p:spPr>
-        <p:txBody>
-          <a:bodyPr wrap="none" rtlCol="0">
-            <a:spAutoFit/>
-          </a:bodyPr>
-          <a:lstStyle/>
-          <a:p>
-            <a:r>
-              <a:rPr lang="en-GB" dirty="0" smtClean="0"/>
-              <a:t>5.54</a:t>
-            </a:r>
-            <a:endParaRPr lang="en-GB" dirty="0"/>
-          </a:p>
-        </p:txBody>
-      </p:sp>
-    </p:spTree>
-    <p:extLst>
-      <p:ext uri="{BB962C8B-B14F-4D97-AF65-F5344CB8AC3E}">
-        <p14:creationId xmlns:p14="http://schemas.microsoft.com/office/powerpoint/2010/main" val="2779325827"/>
-      </p:ext>
-    </p:extLst>
-  </p:cSld>
-  <p:clrMapOvr>
-    <a:masterClrMapping/>
-  </p:clrMapOvr>
-</p:sld>
-</file>
-
-<file path=ppt/slides/slide2.xml><?xml version="1.0" encoding="utf-8"?>
-<p:sld xmlns:a="http://schemas.openxmlformats.org/drawingml/2006/main" xmlns:r="http://schemas.openxmlformats.org/officeDocument/2006/relationships" xmlns:p="http://schemas.openxmlformats.org/presentationml/2006/main">
-  <p:cSld>
-    <p:spTree>
-      <p:nvGrpSpPr>
-        <p:cNvPr id="1" name=""/>
-        <p:cNvGrpSpPr/>
-        <p:nvPr/>
-      </p:nvGrpSpPr>
-      <p:grpSpPr>
-        <a:xfrm>
-          <a:off x="0" y="0"/>
-          <a:ext cx="0" cy="0"/>
-          <a:chOff x="0" y="0"/>
-          <a:chExt cx="0" cy="0"/>
-        </a:xfrm>
-      </p:grpSpPr>
       <p:pic>
         <p:nvPicPr>
-          <p:cNvPr id="2" name="Picture 1"/>
+          <p:cNvPr id="12" name="Picture 11"/>
           <p:cNvPicPr>
             <a:picLocks noChangeAspect="1"/>
           </p:cNvPicPr>
           <p:nvPr/>
         </p:nvPicPr>
         <p:blipFill>
-          <a:blip r:embed="rId3"/>
+          <a:blip r:embed="rId6"/>
           <a:stretch>
             <a:fillRect/>
           </a:stretch>
         </p:blipFill>
         <p:spPr>
           <a:xfrm>
-            <a:off x="1" y="0"/>
-            <a:ext cx="3468063" cy="3600000"/>
+            <a:off x="51485" y="341313"/>
+            <a:ext cx="3505200" cy="3638550"/>
           </a:xfrm>
           <a:prstGeom prst="rect">
             <a:avLst/>
@@ -3791,176 +3459,14 @@
       </p:pic>
       <p:sp>
         <p:nvSpPr>
-          <p:cNvPr id="3" name="TextBox 2"/>
+          <p:cNvPr id="13" name="TextBox 12"/>
           <p:cNvSpPr txBox="1"/>
           <p:nvPr/>
         </p:nvSpPr>
         <p:spPr>
-          <a:xfrm>
-            <a:off x="2353056" y="463296"/>
-            <a:ext cx="758541" cy="369332"/>
-          </a:xfrm>
-          <a:prstGeom prst="rect">
-            <a:avLst/>
-          </a:prstGeom>
-          <a:noFill/>
-        </p:spPr>
-        <p:txBody>
-          <a:bodyPr wrap="none" rtlCol="0">
-            <a:spAutoFit/>
-          </a:bodyPr>
-          <a:lstStyle/>
-          <a:p>
-            <a:r>
-              <a:rPr lang="en-GB" dirty="0" smtClean="0"/>
-              <a:t>14.6%</a:t>
-            </a:r>
-            <a:endParaRPr lang="en-GB" dirty="0"/>
-          </a:p>
-        </p:txBody>
-      </p:sp>
-      <p:pic>
-        <p:nvPicPr>
-          <p:cNvPr id="4" name="Picture 3"/>
-          <p:cNvPicPr>
-            <a:picLocks noChangeAspect="1"/>
-          </p:cNvPicPr>
-          <p:nvPr/>
-        </p:nvPicPr>
-        <p:blipFill>
-          <a:blip r:embed="rId4"/>
-          <a:stretch>
-            <a:fillRect/>
-          </a:stretch>
-        </p:blipFill>
-        <p:spPr>
-          <a:xfrm>
-            <a:off x="-4572" y="3600450"/>
-            <a:ext cx="3468063" cy="3600000"/>
-          </a:xfrm>
-          <a:prstGeom prst="rect">
-            <a:avLst/>
-          </a:prstGeom>
-        </p:spPr>
-      </p:pic>
-    </p:spTree>
-    <p:extLst>
-      <p:ext uri="{BB962C8B-B14F-4D97-AF65-F5344CB8AC3E}">
-        <p14:creationId xmlns:p14="http://schemas.microsoft.com/office/powerpoint/2010/main" val="1322493024"/>
-      </p:ext>
-    </p:extLst>
-  </p:cSld>
-  <p:clrMapOvr>
-    <a:masterClrMapping/>
-  </p:clrMapOvr>
-</p:sld>
-</file>
-
-<file path=ppt/slides/slide3.xml><?xml version="1.0" encoding="utf-8"?>
-<p:sld xmlns:a="http://schemas.openxmlformats.org/drawingml/2006/main" xmlns:r="http://schemas.openxmlformats.org/officeDocument/2006/relationships" xmlns:p="http://schemas.openxmlformats.org/presentationml/2006/main">
-  <p:cSld>
-    <p:spTree>
-      <p:nvGrpSpPr>
-        <p:cNvPr id="1" name=""/>
-        <p:cNvGrpSpPr/>
-        <p:nvPr/>
-      </p:nvGrpSpPr>
-      <p:grpSpPr>
-        <a:xfrm>
-          <a:off x="0" y="0"/>
-          <a:ext cx="0" cy="0"/>
-          <a:chOff x="0" y="0"/>
-          <a:chExt cx="0" cy="0"/>
-        </a:xfrm>
-      </p:grpSpPr>
-      <p:pic>
-        <p:nvPicPr>
-          <p:cNvPr id="2" name="Picture 1"/>
-          <p:cNvPicPr>
-            <a:picLocks noChangeAspect="1"/>
-          </p:cNvPicPr>
-          <p:nvPr/>
-        </p:nvPicPr>
-        <p:blipFill>
-          <a:blip r:embed="rId3"/>
-          <a:stretch>
-            <a:fillRect/>
-          </a:stretch>
-        </p:blipFill>
-        <p:spPr>
-          <a:xfrm>
-            <a:off x="1" y="426720"/>
-            <a:ext cx="3468063" cy="3600000"/>
-          </a:xfrm>
-          <a:prstGeom prst="rect">
-            <a:avLst/>
-          </a:prstGeom>
-        </p:spPr>
-      </p:pic>
-      <p:sp>
-        <p:nvSpPr>
-          <p:cNvPr id="3" name="TextBox 2"/>
-          <p:cNvSpPr txBox="1"/>
-          <p:nvPr/>
-        </p:nvSpPr>
-        <p:spPr>
-          <a:xfrm>
-            <a:off x="2353056" y="890016"/>
-            <a:ext cx="758541" cy="369332"/>
-          </a:xfrm>
-          <a:prstGeom prst="rect">
-            <a:avLst/>
-          </a:prstGeom>
-          <a:noFill/>
-        </p:spPr>
-        <p:txBody>
-          <a:bodyPr wrap="none" rtlCol="0">
-            <a:spAutoFit/>
-          </a:bodyPr>
-          <a:lstStyle/>
-          <a:p>
-            <a:r>
-              <a:rPr lang="en-GB" dirty="0" smtClean="0"/>
-              <a:t>38.5%</a:t>
-            </a:r>
-            <a:endParaRPr lang="en-GB" dirty="0"/>
-          </a:p>
-        </p:txBody>
-      </p:sp>
-      <p:pic>
-        <p:nvPicPr>
-          <p:cNvPr id="4" name="Picture 3"/>
-          <p:cNvPicPr>
-            <a:picLocks noChangeAspect="1"/>
-          </p:cNvPicPr>
-          <p:nvPr/>
-        </p:nvPicPr>
-        <p:blipFill>
-          <a:blip r:embed="rId4"/>
-          <a:stretch>
-            <a:fillRect/>
-          </a:stretch>
-        </p:blipFill>
-        <p:spPr>
-          <a:xfrm>
-            <a:off x="0" y="3599313"/>
-            <a:ext cx="3468063" cy="3600000"/>
-          </a:xfrm>
-          <a:prstGeom prst="rect">
-            <a:avLst/>
-          </a:prstGeom>
-        </p:spPr>
-      </p:pic>
-      <p:sp>
-        <p:nvSpPr>
-          <p:cNvPr id="5" name="TextBox 4"/>
-          <p:cNvSpPr txBox="1"/>
-          <p:nvPr/>
-        </p:nvSpPr>
-        <p:spPr>
-          <a:xfrm>
-            <a:off x="768096" y="3474720"/>
-            <a:ext cx="2023872" cy="461665"/>
+          <a:xfrm rot="16200000">
+            <a:off x="-781336" y="1898131"/>
+            <a:ext cx="2176216" cy="461665"/>
           </a:xfrm>
           <a:prstGeom prst="rect">
             <a:avLst/>
@@ -3977,22 +3483,22 @@
           <a:p>
             <a:r>
               <a:rPr lang="en-GB" sz="2400" dirty="0" smtClean="0"/>
-              <a:t>IgM</a:t>
-            </a:r>
-            <a:endParaRPr lang="en-GB" dirty="0"/>
-          </a:p>
-        </p:txBody>
-      </p:sp>
-      <p:sp>
-        <p:nvSpPr>
-          <p:cNvPr id="6" name="TextBox 5"/>
+              <a:t>Sca-1</a:t>
+            </a:r>
+            <a:endParaRPr lang="en-GB" sz="2400" dirty="0"/>
+          </a:p>
+        </p:txBody>
+      </p:sp>
+      <p:sp>
+        <p:nvSpPr>
+          <p:cNvPr id="14" name="TextBox 13"/>
           <p:cNvSpPr txBox="1"/>
           <p:nvPr/>
         </p:nvSpPr>
         <p:spPr>
-          <a:xfrm rot="16200000">
-            <a:off x="-693539" y="2040072"/>
-            <a:ext cx="2023112" cy="461665"/>
+          <a:xfrm>
+            <a:off x="853796" y="3469893"/>
+            <a:ext cx="2402382" cy="461665"/>
           </a:xfrm>
           <a:prstGeom prst="rect">
             <a:avLst/>
@@ -4009,7 +3515,7 @@
           <a:p>
             <a:r>
               <a:rPr lang="en-GB" sz="2400" dirty="0" smtClean="0"/>
-              <a:t>CD19</a:t>
+              <a:t>Side Scatter</a:t>
             </a:r>
             <a:endParaRPr lang="en-GB" sz="2400" dirty="0"/>
           </a:p>
@@ -4017,14 +3523,14 @@
       </p:sp>
       <p:sp>
         <p:nvSpPr>
-          <p:cNvPr id="7" name="TextBox 6"/>
+          <p:cNvPr id="15" name="TextBox 14"/>
           <p:cNvSpPr txBox="1"/>
           <p:nvPr/>
         </p:nvSpPr>
         <p:spPr>
-          <a:xfrm>
-            <a:off x="768096" y="6662178"/>
-            <a:ext cx="2023872" cy="461665"/>
+          <a:xfrm rot="16200000">
+            <a:off x="2741096" y="1898131"/>
+            <a:ext cx="2176216" cy="461665"/>
           </a:xfrm>
           <a:prstGeom prst="rect">
             <a:avLst/>
@@ -4041,7 +3547,7 @@
           <a:p>
             <a:r>
               <a:rPr lang="en-GB" sz="2400" dirty="0" smtClean="0"/>
-              <a:t>Side Scatter</a:t>
+              <a:t>C-kit</a:t>
             </a:r>
             <a:endParaRPr lang="en-GB" sz="2400" dirty="0"/>
           </a:p>
@@ -4049,14 +3555,14 @@
       </p:sp>
       <p:sp>
         <p:nvSpPr>
-          <p:cNvPr id="8" name="TextBox 7"/>
+          <p:cNvPr id="16" name="TextBox 15"/>
           <p:cNvSpPr txBox="1"/>
           <p:nvPr/>
         </p:nvSpPr>
         <p:spPr>
-          <a:xfrm rot="16200000">
-            <a:off x="-693539" y="5227530"/>
-            <a:ext cx="2023112" cy="461665"/>
+          <a:xfrm>
+            <a:off x="4376228" y="3469893"/>
+            <a:ext cx="2402382" cy="461665"/>
           </a:xfrm>
           <a:prstGeom prst="rect">
             <a:avLst/>
@@ -4073,27 +3579,223 @@
           <a:p>
             <a:r>
               <a:rPr lang="en-GB" sz="2400" dirty="0" smtClean="0"/>
-              <a:t>GFP</a:t>
-            </a:r>
-            <a:endParaRPr lang="en-GB" dirty="0"/>
+              <a:t>Side Scatter</a:t>
+            </a:r>
+            <a:endParaRPr lang="en-GB" sz="2400" dirty="0"/>
+          </a:p>
+        </p:txBody>
+      </p:sp>
+      <p:sp>
+        <p:nvSpPr>
+          <p:cNvPr id="17" name="TextBox 16"/>
+          <p:cNvSpPr txBox="1"/>
+          <p:nvPr/>
+        </p:nvSpPr>
+        <p:spPr>
+          <a:xfrm rot="16200000">
+            <a:off x="6394965" y="1898131"/>
+            <a:ext cx="2176216" cy="461665"/>
+          </a:xfrm>
+          <a:prstGeom prst="rect">
+            <a:avLst/>
+          </a:prstGeom>
+          <a:solidFill>
+            <a:schemeClr val="bg1"/>
+          </a:solidFill>
+        </p:spPr>
+        <p:txBody>
+          <a:bodyPr wrap="square" rtlCol="0">
+            <a:spAutoFit/>
+          </a:bodyPr>
+          <a:lstStyle/>
+          <a:p>
+            <a:r>
+              <a:rPr lang="en-GB" sz="2400" dirty="0" smtClean="0"/>
+              <a:t>IL-7R</a:t>
+            </a:r>
+            <a:r>
+              <a:rPr lang="el-GR" sz="2400" dirty="0" smtClean="0"/>
+              <a:t>α</a:t>
+            </a:r>
+            <a:endParaRPr lang="en-GB" sz="2400" dirty="0"/>
+          </a:p>
+        </p:txBody>
+      </p:sp>
+      <p:sp>
+        <p:nvSpPr>
+          <p:cNvPr id="18" name="TextBox 17"/>
+          <p:cNvSpPr txBox="1"/>
+          <p:nvPr/>
+        </p:nvSpPr>
+        <p:spPr>
+          <a:xfrm>
+            <a:off x="8030097" y="3469893"/>
+            <a:ext cx="2402382" cy="461665"/>
+          </a:xfrm>
+          <a:prstGeom prst="rect">
+            <a:avLst/>
+          </a:prstGeom>
+          <a:solidFill>
+            <a:schemeClr val="bg1"/>
+          </a:solidFill>
+        </p:spPr>
+        <p:txBody>
+          <a:bodyPr wrap="square" rtlCol="0">
+            <a:spAutoFit/>
+          </a:bodyPr>
+          <a:lstStyle/>
+          <a:p>
+            <a:r>
+              <a:rPr lang="en-GB" sz="2400" dirty="0" smtClean="0"/>
+              <a:t>Side Scatter</a:t>
+            </a:r>
+            <a:endParaRPr lang="en-GB" sz="2400" dirty="0"/>
+          </a:p>
+        </p:txBody>
+      </p:sp>
+      <p:sp>
+        <p:nvSpPr>
+          <p:cNvPr id="19" name="TextBox 18"/>
+          <p:cNvSpPr txBox="1"/>
+          <p:nvPr/>
+        </p:nvSpPr>
+        <p:spPr>
+          <a:xfrm rot="16200000">
+            <a:off x="9917397" y="1898131"/>
+            <a:ext cx="2176216" cy="461665"/>
+          </a:xfrm>
+          <a:prstGeom prst="rect">
+            <a:avLst/>
+          </a:prstGeom>
+          <a:solidFill>
+            <a:schemeClr val="bg1"/>
+          </a:solidFill>
+        </p:spPr>
+        <p:txBody>
+          <a:bodyPr wrap="square" rtlCol="0">
+            <a:spAutoFit/>
+          </a:bodyPr>
+          <a:lstStyle/>
+          <a:p>
+            <a:r>
+              <a:rPr lang="en-GB" sz="2400" dirty="0" smtClean="0"/>
+              <a:t>Flt3</a:t>
+            </a:r>
+            <a:endParaRPr lang="en-GB" sz="2400" dirty="0"/>
+          </a:p>
+        </p:txBody>
+      </p:sp>
+      <p:sp>
+        <p:nvSpPr>
+          <p:cNvPr id="20" name="TextBox 19"/>
+          <p:cNvSpPr txBox="1"/>
+          <p:nvPr/>
+        </p:nvSpPr>
+        <p:spPr>
+          <a:xfrm>
+            <a:off x="11552529" y="3469893"/>
+            <a:ext cx="2402382" cy="461665"/>
+          </a:xfrm>
+          <a:prstGeom prst="rect">
+            <a:avLst/>
+          </a:prstGeom>
+          <a:solidFill>
+            <a:schemeClr val="bg1"/>
+          </a:solidFill>
+        </p:spPr>
+        <p:txBody>
+          <a:bodyPr wrap="square" rtlCol="0">
+            <a:spAutoFit/>
+          </a:bodyPr>
+          <a:lstStyle/>
+          <a:p>
+            <a:r>
+              <a:rPr lang="en-GB" sz="2400" dirty="0" smtClean="0"/>
+              <a:t>Side Scatter</a:t>
+            </a:r>
+            <a:endParaRPr lang="en-GB" sz="2400" dirty="0"/>
+          </a:p>
+        </p:txBody>
+      </p:sp>
+      <p:sp>
+        <p:nvSpPr>
+          <p:cNvPr id="23" name="TextBox 22"/>
+          <p:cNvSpPr txBox="1"/>
+          <p:nvPr/>
+        </p:nvSpPr>
+        <p:spPr>
+          <a:xfrm rot="16200000">
+            <a:off x="13559112" y="1849826"/>
+            <a:ext cx="2176216" cy="461665"/>
+          </a:xfrm>
+          <a:prstGeom prst="rect">
+            <a:avLst/>
+          </a:prstGeom>
+          <a:solidFill>
+            <a:schemeClr val="bg1"/>
+          </a:solidFill>
+        </p:spPr>
+        <p:txBody>
+          <a:bodyPr wrap="square" rtlCol="0">
+            <a:spAutoFit/>
+          </a:bodyPr>
+          <a:lstStyle/>
+          <a:p>
+            <a:r>
+              <a:rPr lang="en-GB" sz="2400" dirty="0" smtClean="0"/>
+              <a:t>Ly6D</a:t>
+            </a:r>
+            <a:endParaRPr lang="en-GB" sz="2400" dirty="0"/>
+          </a:p>
+        </p:txBody>
+      </p:sp>
+      <p:sp>
+        <p:nvSpPr>
+          <p:cNvPr id="24" name="TextBox 23"/>
+          <p:cNvSpPr txBox="1"/>
+          <p:nvPr/>
+        </p:nvSpPr>
+        <p:spPr>
+          <a:xfrm>
+            <a:off x="15194244" y="3421588"/>
+            <a:ext cx="2402382" cy="461665"/>
+          </a:xfrm>
+          <a:prstGeom prst="rect">
+            <a:avLst/>
+          </a:prstGeom>
+          <a:solidFill>
+            <a:schemeClr val="bg1"/>
+          </a:solidFill>
+        </p:spPr>
+        <p:txBody>
+          <a:bodyPr wrap="square" rtlCol="0">
+            <a:spAutoFit/>
+          </a:bodyPr>
+          <a:lstStyle/>
+          <a:p>
+            <a:r>
+              <a:rPr lang="en-GB" sz="2400" dirty="0" smtClean="0"/>
+              <a:t>Side Scatter</a:t>
+            </a:r>
+            <a:endParaRPr lang="en-GB" sz="2400" dirty="0"/>
           </a:p>
         </p:txBody>
       </p:sp>
       <p:cxnSp>
         <p:nvCxnSpPr>
-          <p:cNvPr id="10" name="Straight Arrow Connector 9"/>
+          <p:cNvPr id="26" name="Straight Arrow Connector 25"/>
           <p:cNvCxnSpPr/>
           <p:nvPr/>
         </p:nvCxnSpPr>
         <p:spPr>
           <a:xfrm>
-            <a:off x="2450592" y="2243328"/>
-            <a:ext cx="0" cy="1620000"/>
+            <a:off x="2313709" y="1759527"/>
+            <a:ext cx="1746328" cy="0"/>
           </a:xfrm>
           <a:prstGeom prst="straightConnector1">
             <a:avLst/>
           </a:prstGeom>
-          <a:ln w="19050">
+          <a:ln>
             <a:solidFill>
               <a:schemeClr val="tx1"/>
             </a:solidFill>
@@ -4115,16 +3817,124 @@
           </a:fontRef>
         </p:style>
       </p:cxnSp>
-      <p:sp>
-        <p:nvSpPr>
-          <p:cNvPr id="11" name="TextBox 10"/>
+      <p:cxnSp>
+        <p:nvCxnSpPr>
+          <p:cNvPr id="27" name="Straight Arrow Connector 26"/>
+          <p:cNvCxnSpPr/>
+          <p:nvPr/>
+        </p:nvCxnSpPr>
+        <p:spPr>
+          <a:xfrm>
+            <a:off x="5905446" y="1953491"/>
+            <a:ext cx="1746328" cy="0"/>
+          </a:xfrm>
+          <a:prstGeom prst="straightConnector1">
+            <a:avLst/>
+          </a:prstGeom>
+          <a:ln>
+            <a:solidFill>
+              <a:schemeClr val="tx1"/>
+            </a:solidFill>
+            <a:tailEnd type="triangle"/>
+          </a:ln>
+        </p:spPr>
+        <p:style>
+          <a:lnRef idx="1">
+            <a:schemeClr val="accent1"/>
+          </a:lnRef>
+          <a:fillRef idx="0">
+            <a:schemeClr val="accent1"/>
+          </a:fillRef>
+          <a:effectRef idx="0">
+            <a:schemeClr val="accent1"/>
+          </a:effectRef>
+          <a:fontRef idx="minor">
+            <a:schemeClr val="tx1"/>
+          </a:fontRef>
+        </p:style>
+      </p:cxnSp>
+      <p:cxnSp>
+        <p:nvCxnSpPr>
+          <p:cNvPr id="28" name="Straight Arrow Connector 27"/>
+          <p:cNvCxnSpPr/>
+          <p:nvPr/>
+        </p:nvCxnSpPr>
+        <p:spPr>
+          <a:xfrm>
+            <a:off x="9796338" y="1717963"/>
+            <a:ext cx="1440000" cy="0"/>
+          </a:xfrm>
+          <a:prstGeom prst="straightConnector1">
+            <a:avLst/>
+          </a:prstGeom>
+          <a:ln>
+            <a:solidFill>
+              <a:schemeClr val="tx1"/>
+            </a:solidFill>
+            <a:tailEnd type="triangle"/>
+          </a:ln>
+        </p:spPr>
+        <p:style>
+          <a:lnRef idx="1">
+            <a:schemeClr val="accent1"/>
+          </a:lnRef>
+          <a:fillRef idx="0">
+            <a:schemeClr val="accent1"/>
+          </a:fillRef>
+          <a:effectRef idx="0">
+            <a:schemeClr val="accent1"/>
+          </a:effectRef>
+          <a:fontRef idx="minor">
+            <a:schemeClr val="tx1"/>
+          </a:fontRef>
+        </p:style>
+      </p:cxnSp>
+      <p:cxnSp>
+        <p:nvCxnSpPr>
+          <p:cNvPr id="29" name="Straight Arrow Connector 28"/>
+          <p:cNvCxnSpPr/>
+          <p:nvPr/>
+        </p:nvCxnSpPr>
+        <p:spPr>
+          <a:xfrm>
+            <a:off x="13441890" y="1717963"/>
+            <a:ext cx="1440000" cy="0"/>
+          </a:xfrm>
+          <a:prstGeom prst="straightConnector1">
+            <a:avLst/>
+          </a:prstGeom>
+          <a:ln>
+            <a:solidFill>
+              <a:schemeClr val="tx1"/>
+            </a:solidFill>
+            <a:tailEnd type="triangle"/>
+          </a:ln>
+        </p:spPr>
+        <p:style>
+          <a:lnRef idx="1">
+            <a:schemeClr val="accent1"/>
+          </a:lnRef>
+          <a:fillRef idx="0">
+            <a:schemeClr val="accent1"/>
+          </a:fillRef>
+          <a:effectRef idx="0">
+            <a:schemeClr val="accent1"/>
+          </a:effectRef>
+          <a:fontRef idx="minor">
+            <a:schemeClr val="tx1"/>
+          </a:fontRef>
+        </p:style>
+      </p:cxnSp>
+      <p:sp>
+        <p:nvSpPr>
+          <p:cNvPr id="30" name="TextBox 29"/>
           <p:cNvSpPr txBox="1"/>
           <p:nvPr/>
         </p:nvSpPr>
         <p:spPr>
           <a:xfrm>
-            <a:off x="1341161" y="242054"/>
-            <a:ext cx="1106585" cy="461665"/>
+            <a:off x="16847126" y="992550"/>
+            <a:ext cx="755335" cy="461665"/>
           </a:xfrm>
           <a:prstGeom prst="rect">
             <a:avLst/>
@@ -4139,7 +3949,133 @@
           <a:p>
             <a:r>
               <a:rPr lang="en-GB" sz="2400" dirty="0" smtClean="0"/>
-              <a:t>Control</a:t>
+              <a:t>BLPs</a:t>
+            </a:r>
+            <a:endParaRPr lang="en-GB" sz="2400" dirty="0"/>
+          </a:p>
+        </p:txBody>
+      </p:sp>
+      <p:sp>
+        <p:nvSpPr>
+          <p:cNvPr id="31" name="Rectangle 30"/>
+          <p:cNvSpPr/>
+          <p:nvPr/>
+        </p:nvSpPr>
+        <p:spPr>
+          <a:xfrm>
+            <a:off x="1011382" y="1717963"/>
+            <a:ext cx="651163" cy="442625"/>
+          </a:xfrm>
+          <a:prstGeom prst="rect">
+            <a:avLst/>
+          </a:prstGeom>
+          <a:solidFill>
+            <a:schemeClr val="bg1"/>
+          </a:solidFill>
+          <a:ln>
+            <a:solidFill>
+              <a:schemeClr val="bg1"/>
+            </a:solidFill>
+          </a:ln>
+        </p:spPr>
+        <p:style>
+          <a:lnRef idx="2">
+            <a:schemeClr val="accent1">
+              <a:shade val="50000"/>
+            </a:schemeClr>
+          </a:lnRef>
+          <a:fillRef idx="1">
+            <a:schemeClr val="accent1"/>
+          </a:fillRef>
+          <a:effectRef idx="0">
+            <a:schemeClr val="accent1"/>
+          </a:effectRef>
+          <a:fontRef idx="minor">
+            <a:schemeClr val="lt1"/>
+          </a:fontRef>
+        </p:style>
+        <p:txBody>
+          <a:bodyPr rtlCol="0" anchor="ctr"/>
+          <a:lstStyle/>
+          <a:p>
+            <a:pPr algn="ctr"/>
+            <a:endParaRPr lang="en-GB"/>
+          </a:p>
+        </p:txBody>
+      </p:sp>
+      <p:sp>
+        <p:nvSpPr>
+          <p:cNvPr id="32" name="Rectangle 31"/>
+          <p:cNvSpPr/>
+          <p:nvPr/>
+        </p:nvSpPr>
+        <p:spPr>
+          <a:xfrm>
+            <a:off x="4662954" y="1692730"/>
+            <a:ext cx="651163" cy="442625"/>
+          </a:xfrm>
+          <a:prstGeom prst="rect">
+            <a:avLst/>
+          </a:prstGeom>
+          <a:solidFill>
+            <a:schemeClr val="bg1"/>
+          </a:solidFill>
+          <a:ln>
+            <a:solidFill>
+              <a:schemeClr val="bg1"/>
+            </a:solidFill>
+          </a:ln>
+        </p:spPr>
+        <p:style>
+          <a:lnRef idx="2">
+            <a:schemeClr val="accent1">
+              <a:shade val="50000"/>
+            </a:schemeClr>
+          </a:lnRef>
+          <a:fillRef idx="1">
+            <a:schemeClr val="accent1"/>
+          </a:fillRef>
+          <a:effectRef idx="0">
+            <a:schemeClr val="accent1"/>
+          </a:effectRef>
+          <a:fontRef idx="minor">
+            <a:schemeClr val="lt1"/>
+          </a:fontRef>
+        </p:style>
+        <p:txBody>
+          <a:bodyPr rtlCol="0" anchor="ctr"/>
+          <a:lstStyle/>
+          <a:p>
+            <a:pPr algn="ctr"/>
+            <a:endParaRPr lang="en-GB"/>
+          </a:p>
+        </p:txBody>
+      </p:sp>
+      <p:sp>
+        <p:nvSpPr>
+          <p:cNvPr id="33" name="TextBox 32"/>
+          <p:cNvSpPr txBox="1"/>
+          <p:nvPr/>
+        </p:nvSpPr>
+        <p:spPr>
+          <a:xfrm>
+            <a:off x="16841291" y="2255373"/>
+            <a:ext cx="766557" cy="461665"/>
+          </a:xfrm>
+          <a:prstGeom prst="rect">
+            <a:avLst/>
+          </a:prstGeom>
+          <a:noFill/>
+        </p:spPr>
+        <p:txBody>
+          <a:bodyPr wrap="none" rtlCol="0">
+            <a:spAutoFit/>
+          </a:bodyPr>
+          <a:lstStyle/>
+          <a:p>
+            <a:r>
+              <a:rPr lang="en-GB" sz="2400" dirty="0" smtClean="0"/>
+              <a:t>ALPs</a:t>
             </a:r>
             <a:endParaRPr lang="en-GB" sz="2400" dirty="0"/>
           </a:p>
@@ -4148,7 +4084,7 @@
     </p:spTree>
     <p:extLst>
       <p:ext uri="{BB962C8B-B14F-4D97-AF65-F5344CB8AC3E}">
-        <p14:creationId xmlns:p14="http://schemas.microsoft.com/office/powerpoint/2010/main" val="2928251300"/>
+        <p14:creationId xmlns:p14="http://schemas.microsoft.com/office/powerpoint/2010/main" val="3391358334"/>
       </p:ext>
     </p:extLst>
   </p:cSld>

</xml_diff>